<commit_message>
tool tips and updated pp
</commit_message>
<xml_diff>
--- a/www/RI_GUIDE.pptx
+++ b/www/RI_GUIDE.pptx
@@ -10954,6 +10954,671 @@
           </a:p>
         </p:txBody>
       </p:sp>
+      <p:cxnSp>
+        <p:nvCxnSpPr>
+          <p:cNvPr id="3" name="Straight Arrow Connector 2">
+            <a:extLst>
+              <a:ext uri="{FF2B5EF4-FFF2-40B4-BE49-F238E27FC236}">
+                <a16:creationId xmlns:a16="http://schemas.microsoft.com/office/drawing/2014/main" id="{7F946D40-4876-5633-9353-1FDDBAB80C15}"/>
+              </a:ext>
+            </a:extLst>
+          </p:cNvPr>
+          <p:cNvCxnSpPr>
+            <a:cxnSpLocks/>
+          </p:cNvCxnSpPr>
+          <p:nvPr/>
+        </p:nvCxnSpPr>
+        <p:spPr>
+          <a:xfrm flipH="1" flipV="1">
+            <a:off x="2120348" y="2304041"/>
+            <a:ext cx="1769165" cy="12736"/>
+          </a:xfrm>
+          <a:prstGeom prst="straightConnector1">
+            <a:avLst/>
+          </a:prstGeom>
+          <a:ln>
+            <a:tailEnd type="triangle"/>
+          </a:ln>
+        </p:spPr>
+        <p:style>
+          <a:lnRef idx="1">
+            <a:schemeClr val="dk1"/>
+          </a:lnRef>
+          <a:fillRef idx="0">
+            <a:schemeClr val="dk1"/>
+          </a:fillRef>
+          <a:effectRef idx="0">
+            <a:schemeClr val="dk1"/>
+          </a:effectRef>
+          <a:fontRef idx="minor">
+            <a:schemeClr val="tx1"/>
+          </a:fontRef>
+        </p:style>
+      </p:cxnSp>
+      <p:cxnSp>
+        <p:nvCxnSpPr>
+          <p:cNvPr id="11" name="Straight Arrow Connector 10">
+            <a:extLst>
+              <a:ext uri="{FF2B5EF4-FFF2-40B4-BE49-F238E27FC236}">
+                <a16:creationId xmlns:a16="http://schemas.microsoft.com/office/drawing/2014/main" id="{A1CFC0C8-79FC-B8B9-E215-7DB4DFAB1E90}"/>
+              </a:ext>
+            </a:extLst>
+          </p:cNvPr>
+          <p:cNvCxnSpPr>
+            <a:cxnSpLocks/>
+          </p:cNvCxnSpPr>
+          <p:nvPr/>
+        </p:nvCxnSpPr>
+        <p:spPr>
+          <a:xfrm flipH="1">
+            <a:off x="4174435" y="1013792"/>
+            <a:ext cx="596348" cy="0"/>
+          </a:xfrm>
+          <a:prstGeom prst="straightConnector1">
+            <a:avLst/>
+          </a:prstGeom>
+          <a:ln>
+            <a:tailEnd type="triangle"/>
+          </a:ln>
+        </p:spPr>
+        <p:style>
+          <a:lnRef idx="1">
+            <a:schemeClr val="dk1"/>
+          </a:lnRef>
+          <a:fillRef idx="0">
+            <a:schemeClr val="dk1"/>
+          </a:fillRef>
+          <a:effectRef idx="0">
+            <a:schemeClr val="dk1"/>
+          </a:effectRef>
+          <a:fontRef idx="minor">
+            <a:schemeClr val="tx1"/>
+          </a:fontRef>
+        </p:style>
+      </p:cxnSp>
+      <p:cxnSp>
+        <p:nvCxnSpPr>
+          <p:cNvPr id="13" name="Straight Arrow Connector 12">
+            <a:extLst>
+              <a:ext uri="{FF2B5EF4-FFF2-40B4-BE49-F238E27FC236}">
+                <a16:creationId xmlns:a16="http://schemas.microsoft.com/office/drawing/2014/main" id="{95E59FFD-7EE8-D193-7B5B-61E31BD55009}"/>
+              </a:ext>
+            </a:extLst>
+          </p:cNvPr>
+          <p:cNvCxnSpPr>
+            <a:cxnSpLocks/>
+          </p:cNvCxnSpPr>
+          <p:nvPr/>
+        </p:nvCxnSpPr>
+        <p:spPr>
+          <a:xfrm flipH="1" flipV="1">
+            <a:off x="3054626" y="1106557"/>
+            <a:ext cx="602974" cy="188384"/>
+          </a:xfrm>
+          <a:prstGeom prst="straightConnector1">
+            <a:avLst/>
+          </a:prstGeom>
+          <a:ln>
+            <a:tailEnd type="triangle"/>
+          </a:ln>
+        </p:spPr>
+        <p:style>
+          <a:lnRef idx="1">
+            <a:schemeClr val="dk1"/>
+          </a:lnRef>
+          <a:fillRef idx="0">
+            <a:schemeClr val="dk1"/>
+          </a:fillRef>
+          <a:effectRef idx="0">
+            <a:schemeClr val="dk1"/>
+          </a:effectRef>
+          <a:fontRef idx="minor">
+            <a:schemeClr val="tx1"/>
+          </a:fontRef>
+        </p:style>
+      </p:cxnSp>
+      <p:cxnSp>
+        <p:nvCxnSpPr>
+          <p:cNvPr id="17" name="Straight Arrow Connector 16">
+            <a:extLst>
+              <a:ext uri="{FF2B5EF4-FFF2-40B4-BE49-F238E27FC236}">
+                <a16:creationId xmlns:a16="http://schemas.microsoft.com/office/drawing/2014/main" id="{B8D458DA-8D1D-E3AF-CBC3-1B948A7719D1}"/>
+              </a:ext>
+            </a:extLst>
+          </p:cNvPr>
+          <p:cNvCxnSpPr>
+            <a:cxnSpLocks/>
+          </p:cNvCxnSpPr>
+          <p:nvPr/>
+        </p:nvCxnSpPr>
+        <p:spPr>
+          <a:xfrm>
+            <a:off x="7116417" y="1818402"/>
+            <a:ext cx="616226" cy="6627"/>
+          </a:xfrm>
+          <a:prstGeom prst="straightConnector1">
+            <a:avLst/>
+          </a:prstGeom>
+          <a:ln>
+            <a:tailEnd type="triangle"/>
+          </a:ln>
+        </p:spPr>
+        <p:style>
+          <a:lnRef idx="1">
+            <a:schemeClr val="dk1"/>
+          </a:lnRef>
+          <a:fillRef idx="0">
+            <a:schemeClr val="dk1"/>
+          </a:fillRef>
+          <a:effectRef idx="0">
+            <a:schemeClr val="dk1"/>
+          </a:effectRef>
+          <a:fontRef idx="minor">
+            <a:schemeClr val="tx1"/>
+          </a:fontRef>
+        </p:style>
+      </p:cxnSp>
+      <p:cxnSp>
+        <p:nvCxnSpPr>
+          <p:cNvPr id="19" name="Straight Arrow Connector 18">
+            <a:extLst>
+              <a:ext uri="{FF2B5EF4-FFF2-40B4-BE49-F238E27FC236}">
+                <a16:creationId xmlns:a16="http://schemas.microsoft.com/office/drawing/2014/main" id="{FEDFE380-AFB5-EAEE-B6D7-6997B16D2651}"/>
+              </a:ext>
+            </a:extLst>
+          </p:cNvPr>
+          <p:cNvCxnSpPr>
+            <a:cxnSpLocks/>
+          </p:cNvCxnSpPr>
+          <p:nvPr/>
+        </p:nvCxnSpPr>
+        <p:spPr>
+          <a:xfrm>
+            <a:off x="6614491" y="3933682"/>
+            <a:ext cx="0" cy="475578"/>
+          </a:xfrm>
+          <a:prstGeom prst="straightConnector1">
+            <a:avLst/>
+          </a:prstGeom>
+          <a:ln>
+            <a:tailEnd type="triangle"/>
+          </a:ln>
+        </p:spPr>
+        <p:style>
+          <a:lnRef idx="1">
+            <a:schemeClr val="dk1"/>
+          </a:lnRef>
+          <a:fillRef idx="0">
+            <a:schemeClr val="dk1"/>
+          </a:fillRef>
+          <a:effectRef idx="0">
+            <a:schemeClr val="dk1"/>
+          </a:effectRef>
+          <a:fontRef idx="minor">
+            <a:schemeClr val="tx1"/>
+          </a:fontRef>
+        </p:style>
+      </p:cxnSp>
+      <p:cxnSp>
+        <p:nvCxnSpPr>
+          <p:cNvPr id="22" name="Straight Arrow Connector 21">
+            <a:extLst>
+              <a:ext uri="{FF2B5EF4-FFF2-40B4-BE49-F238E27FC236}">
+                <a16:creationId xmlns:a16="http://schemas.microsoft.com/office/drawing/2014/main" id="{31BFAB9D-D798-4A6B-F625-F34A3D3C1EBE}"/>
+              </a:ext>
+            </a:extLst>
+          </p:cNvPr>
+          <p:cNvCxnSpPr>
+            <a:cxnSpLocks/>
+            <a:stCxn id="39" idx="2"/>
+          </p:cNvCxnSpPr>
+          <p:nvPr/>
+        </p:nvCxnSpPr>
+        <p:spPr>
+          <a:xfrm flipH="1">
+            <a:off x="2759764" y="3675361"/>
+            <a:ext cx="1675576" cy="756123"/>
+          </a:xfrm>
+          <a:prstGeom prst="straightConnector1">
+            <a:avLst/>
+          </a:prstGeom>
+          <a:ln>
+            <a:tailEnd type="triangle"/>
+          </a:ln>
+        </p:spPr>
+        <p:style>
+          <a:lnRef idx="1">
+            <a:schemeClr val="dk1"/>
+          </a:lnRef>
+          <a:fillRef idx="0">
+            <a:schemeClr val="dk1"/>
+          </a:fillRef>
+          <a:effectRef idx="0">
+            <a:schemeClr val="dk1"/>
+          </a:effectRef>
+          <a:fontRef idx="minor">
+            <a:schemeClr val="tx1"/>
+          </a:fontRef>
+        </p:style>
+      </p:cxnSp>
+      <p:cxnSp>
+        <p:nvCxnSpPr>
+          <p:cNvPr id="26" name="Straight Arrow Connector 25">
+            <a:extLst>
+              <a:ext uri="{FF2B5EF4-FFF2-40B4-BE49-F238E27FC236}">
+                <a16:creationId xmlns:a16="http://schemas.microsoft.com/office/drawing/2014/main" id="{F06230CA-8963-C6DB-8F4D-43874DE0A409}"/>
+              </a:ext>
+            </a:extLst>
+          </p:cNvPr>
+          <p:cNvCxnSpPr>
+            <a:cxnSpLocks/>
+          </p:cNvCxnSpPr>
+          <p:nvPr/>
+        </p:nvCxnSpPr>
+        <p:spPr>
+          <a:xfrm flipH="1">
+            <a:off x="1371600" y="3273055"/>
+            <a:ext cx="2232991" cy="1454189"/>
+          </a:xfrm>
+          <a:prstGeom prst="straightConnector1">
+            <a:avLst/>
+          </a:prstGeom>
+          <a:ln>
+            <a:tailEnd type="triangle"/>
+          </a:ln>
+        </p:spPr>
+        <p:style>
+          <a:lnRef idx="1">
+            <a:schemeClr val="dk1"/>
+          </a:lnRef>
+          <a:fillRef idx="0">
+            <a:schemeClr val="dk1"/>
+          </a:fillRef>
+          <a:effectRef idx="0">
+            <a:schemeClr val="dk1"/>
+          </a:effectRef>
+          <a:fontRef idx="minor">
+            <a:schemeClr val="tx1"/>
+          </a:fontRef>
+        </p:style>
+      </p:cxnSp>
+      <p:cxnSp>
+        <p:nvCxnSpPr>
+          <p:cNvPr id="31" name="Straight Arrow Connector 30">
+            <a:extLst>
+              <a:ext uri="{FF2B5EF4-FFF2-40B4-BE49-F238E27FC236}">
+                <a16:creationId xmlns:a16="http://schemas.microsoft.com/office/drawing/2014/main" id="{C0844D0F-A902-575B-B544-2CB0BB3BA794}"/>
+              </a:ext>
+            </a:extLst>
+          </p:cNvPr>
+          <p:cNvCxnSpPr>
+            <a:cxnSpLocks/>
+          </p:cNvCxnSpPr>
+          <p:nvPr/>
+        </p:nvCxnSpPr>
+        <p:spPr>
+          <a:xfrm flipH="1">
+            <a:off x="3004930" y="3181516"/>
+            <a:ext cx="3364395" cy="1511832"/>
+          </a:xfrm>
+          <a:prstGeom prst="straightConnector1">
+            <a:avLst/>
+          </a:prstGeom>
+          <a:ln>
+            <a:tailEnd type="triangle"/>
+          </a:ln>
+        </p:spPr>
+        <p:style>
+          <a:lnRef idx="1">
+            <a:schemeClr val="dk1"/>
+          </a:lnRef>
+          <a:fillRef idx="0">
+            <a:schemeClr val="dk1"/>
+          </a:fillRef>
+          <a:effectRef idx="0">
+            <a:schemeClr val="dk1"/>
+          </a:effectRef>
+          <a:fontRef idx="minor">
+            <a:schemeClr val="tx1"/>
+          </a:fontRef>
+        </p:style>
+      </p:cxnSp>
+      <p:sp>
+        <p:nvSpPr>
+          <p:cNvPr id="33" name="TextBox 32">
+            <a:extLst>
+              <a:ext uri="{FF2B5EF4-FFF2-40B4-BE49-F238E27FC236}">
+                <a16:creationId xmlns:a16="http://schemas.microsoft.com/office/drawing/2014/main" id="{1415128F-7085-7A72-7DFA-9385C38E5F8D}"/>
+              </a:ext>
+            </a:extLst>
+          </p:cNvPr>
+          <p:cNvSpPr txBox="1"/>
+          <p:nvPr/>
+        </p:nvSpPr>
+        <p:spPr>
+          <a:xfrm>
+            <a:off x="4770783" y="894831"/>
+            <a:ext cx="2888974" cy="246221"/>
+          </a:xfrm>
+          <a:prstGeom prst="rect">
+            <a:avLst/>
+          </a:prstGeom>
+          <a:noFill/>
+          <a:ln>
+            <a:solidFill>
+              <a:schemeClr val="tx1"/>
+            </a:solidFill>
+          </a:ln>
+        </p:spPr>
+        <p:txBody>
+          <a:bodyPr wrap="square" rtlCol="0">
+            <a:spAutoFit/>
+          </a:bodyPr>
+          <a:lstStyle/>
+          <a:p>
+            <a:r>
+              <a:rPr lang="en-US" sz="1000" dirty="0"/>
+              <a:t>Download updated RI raster (.</a:t>
+            </a:r>
+            <a:r>
+              <a:rPr lang="en-US" sz="1000" dirty="0" err="1"/>
+              <a:t>tif</a:t>
+            </a:r>
+            <a:r>
+              <a:rPr lang="en-US" sz="1000" dirty="0"/>
+              <a:t>) and weights (.xlsx)</a:t>
+            </a:r>
+            <a:endParaRPr lang="en-CA" sz="1000" dirty="0"/>
+          </a:p>
+        </p:txBody>
+      </p:sp>
+      <p:sp>
+        <p:nvSpPr>
+          <p:cNvPr id="34" name="TextBox 33">
+            <a:extLst>
+              <a:ext uri="{FF2B5EF4-FFF2-40B4-BE49-F238E27FC236}">
+                <a16:creationId xmlns:a16="http://schemas.microsoft.com/office/drawing/2014/main" id="{1E4E0254-65E9-4CC0-9EFE-8CFFFE27683C}"/>
+              </a:ext>
+            </a:extLst>
+          </p:cNvPr>
+          <p:cNvSpPr txBox="1"/>
+          <p:nvPr/>
+        </p:nvSpPr>
+        <p:spPr>
+          <a:xfrm>
+            <a:off x="6334127" y="1701918"/>
+            <a:ext cx="782290" cy="246221"/>
+          </a:xfrm>
+          <a:prstGeom prst="rect">
+            <a:avLst/>
+          </a:prstGeom>
+          <a:noFill/>
+          <a:ln>
+            <a:solidFill>
+              <a:schemeClr val="tx1"/>
+            </a:solidFill>
+          </a:ln>
+        </p:spPr>
+        <p:txBody>
+          <a:bodyPr wrap="square" rtlCol="0">
+            <a:spAutoFit/>
+          </a:bodyPr>
+          <a:lstStyle/>
+          <a:p>
+            <a:r>
+              <a:rPr lang="en-US" sz="1000" dirty="0"/>
+              <a:t>View layers</a:t>
+            </a:r>
+            <a:endParaRPr lang="en-CA" sz="1000" dirty="0"/>
+          </a:p>
+        </p:txBody>
+      </p:sp>
+      <p:sp>
+        <p:nvSpPr>
+          <p:cNvPr id="35" name="TextBox 34">
+            <a:extLst>
+              <a:ext uri="{FF2B5EF4-FFF2-40B4-BE49-F238E27FC236}">
+                <a16:creationId xmlns:a16="http://schemas.microsoft.com/office/drawing/2014/main" id="{F1756EB0-DFDE-45B3-547E-9D7F7968A984}"/>
+              </a:ext>
+            </a:extLst>
+          </p:cNvPr>
+          <p:cNvSpPr txBox="1"/>
+          <p:nvPr/>
+        </p:nvSpPr>
+        <p:spPr>
+          <a:xfrm>
+            <a:off x="3889513" y="2193667"/>
+            <a:ext cx="1000540" cy="246221"/>
+          </a:xfrm>
+          <a:prstGeom prst="rect">
+            <a:avLst/>
+          </a:prstGeom>
+          <a:noFill/>
+          <a:ln>
+            <a:solidFill>
+              <a:schemeClr val="tx1"/>
+            </a:solidFill>
+          </a:ln>
+        </p:spPr>
+        <p:txBody>
+          <a:bodyPr wrap="square" rtlCol="0">
+            <a:spAutoFit/>
+          </a:bodyPr>
+          <a:lstStyle/>
+          <a:p>
+            <a:r>
+              <a:rPr lang="en-US" sz="1000" dirty="0"/>
+              <a:t>Update weights</a:t>
+            </a:r>
+            <a:endParaRPr lang="en-CA" sz="1000" dirty="0"/>
+          </a:p>
+        </p:txBody>
+      </p:sp>
+      <p:sp>
+        <p:nvSpPr>
+          <p:cNvPr id="38" name="TextBox 37">
+            <a:extLst>
+              <a:ext uri="{FF2B5EF4-FFF2-40B4-BE49-F238E27FC236}">
+                <a16:creationId xmlns:a16="http://schemas.microsoft.com/office/drawing/2014/main" id="{F47D3899-CBFC-512B-2C4D-461D339A121A}"/>
+              </a:ext>
+            </a:extLst>
+          </p:cNvPr>
+          <p:cNvSpPr txBox="1"/>
+          <p:nvPr/>
+        </p:nvSpPr>
+        <p:spPr>
+          <a:xfrm>
+            <a:off x="3654287" y="1246140"/>
+            <a:ext cx="1116496" cy="246221"/>
+          </a:xfrm>
+          <a:prstGeom prst="rect">
+            <a:avLst/>
+          </a:prstGeom>
+          <a:noFill/>
+          <a:ln>
+            <a:solidFill>
+              <a:schemeClr val="tx1"/>
+            </a:solidFill>
+          </a:ln>
+        </p:spPr>
+        <p:txBody>
+          <a:bodyPr wrap="square" rtlCol="0">
+            <a:spAutoFit/>
+          </a:bodyPr>
+          <a:lstStyle/>
+          <a:p>
+            <a:r>
+              <a:rPr lang="en-US" sz="1000" dirty="0"/>
+              <a:t>View PowerPoint</a:t>
+            </a:r>
+            <a:endParaRPr lang="en-CA" sz="1000" dirty="0"/>
+          </a:p>
+        </p:txBody>
+      </p:sp>
+      <p:sp>
+        <p:nvSpPr>
+          <p:cNvPr id="39" name="TextBox 38">
+            <a:extLst>
+              <a:ext uri="{FF2B5EF4-FFF2-40B4-BE49-F238E27FC236}">
+                <a16:creationId xmlns:a16="http://schemas.microsoft.com/office/drawing/2014/main" id="{482025D1-25EB-F4EC-D28C-1322055D9B02}"/>
+              </a:ext>
+            </a:extLst>
+          </p:cNvPr>
+          <p:cNvSpPr txBox="1"/>
+          <p:nvPr/>
+        </p:nvSpPr>
+        <p:spPr>
+          <a:xfrm>
+            <a:off x="3797579" y="3429140"/>
+            <a:ext cx="1275522" cy="246221"/>
+          </a:xfrm>
+          <a:prstGeom prst="rect">
+            <a:avLst/>
+          </a:prstGeom>
+          <a:noFill/>
+          <a:ln>
+            <a:solidFill>
+              <a:schemeClr val="tx1"/>
+            </a:solidFill>
+          </a:ln>
+        </p:spPr>
+        <p:txBody>
+          <a:bodyPr wrap="square" rtlCol="0">
+            <a:spAutoFit/>
+          </a:bodyPr>
+          <a:lstStyle/>
+          <a:p>
+            <a:r>
+              <a:rPr lang="en-US" sz="1000" dirty="0"/>
+              <a:t>Tally of total weights</a:t>
+            </a:r>
+            <a:endParaRPr lang="en-CA" sz="1000" dirty="0"/>
+          </a:p>
+        </p:txBody>
+      </p:sp>
+      <p:sp>
+        <p:nvSpPr>
+          <p:cNvPr id="41" name="TextBox 40">
+            <a:extLst>
+              <a:ext uri="{FF2B5EF4-FFF2-40B4-BE49-F238E27FC236}">
+                <a16:creationId xmlns:a16="http://schemas.microsoft.com/office/drawing/2014/main" id="{A0A94220-16BB-4636-DAFB-15C118883A0A}"/>
+              </a:ext>
+            </a:extLst>
+          </p:cNvPr>
+          <p:cNvSpPr txBox="1"/>
+          <p:nvPr/>
+        </p:nvSpPr>
+        <p:spPr>
+          <a:xfrm>
+            <a:off x="6212369" y="3647752"/>
+            <a:ext cx="804244" cy="246221"/>
+          </a:xfrm>
+          <a:prstGeom prst="rect">
+            <a:avLst/>
+          </a:prstGeom>
+          <a:noFill/>
+          <a:ln>
+            <a:solidFill>
+              <a:schemeClr val="tx1"/>
+            </a:solidFill>
+          </a:ln>
+        </p:spPr>
+        <p:txBody>
+          <a:bodyPr wrap="square" rtlCol="0">
+            <a:spAutoFit/>
+          </a:bodyPr>
+          <a:lstStyle/>
+          <a:p>
+            <a:r>
+              <a:rPr lang="en-US" sz="1000" dirty="0"/>
+              <a:t>RI Equation</a:t>
+            </a:r>
+            <a:endParaRPr lang="en-CA" sz="1000" dirty="0"/>
+          </a:p>
+        </p:txBody>
+      </p:sp>
+      <p:sp>
+        <p:nvSpPr>
+          <p:cNvPr id="42" name="TextBox 41">
+            <a:extLst>
+              <a:ext uri="{FF2B5EF4-FFF2-40B4-BE49-F238E27FC236}">
+                <a16:creationId xmlns:a16="http://schemas.microsoft.com/office/drawing/2014/main" id="{EFC92FBE-09BB-1C6C-590E-7044A686F432}"/>
+              </a:ext>
+            </a:extLst>
+          </p:cNvPr>
+          <p:cNvSpPr txBox="1"/>
+          <p:nvPr/>
+        </p:nvSpPr>
+        <p:spPr>
+          <a:xfrm>
+            <a:off x="3459644" y="2872945"/>
+            <a:ext cx="1403490" cy="400110"/>
+          </a:xfrm>
+          <a:prstGeom prst="rect">
+            <a:avLst/>
+          </a:prstGeom>
+          <a:noFill/>
+          <a:ln>
+            <a:solidFill>
+              <a:schemeClr val="tx1"/>
+            </a:solidFill>
+          </a:ln>
+        </p:spPr>
+        <p:txBody>
+          <a:bodyPr wrap="square" rtlCol="0">
+            <a:spAutoFit/>
+          </a:bodyPr>
+          <a:lstStyle/>
+          <a:p>
+            <a:r>
+              <a:rPr lang="en-US" sz="1000" dirty="0"/>
+              <a:t>Reset weights to CP&amp;P Recommendation</a:t>
+            </a:r>
+            <a:endParaRPr lang="en-CA" sz="1000" dirty="0"/>
+          </a:p>
+        </p:txBody>
+      </p:sp>
+      <p:sp>
+        <p:nvSpPr>
+          <p:cNvPr id="45" name="TextBox 44">
+            <a:extLst>
+              <a:ext uri="{FF2B5EF4-FFF2-40B4-BE49-F238E27FC236}">
+                <a16:creationId xmlns:a16="http://schemas.microsoft.com/office/drawing/2014/main" id="{2E464E93-20BA-7220-D686-C87339E83F98}"/>
+              </a:ext>
+            </a:extLst>
+          </p:cNvPr>
+          <p:cNvSpPr txBox="1"/>
+          <p:nvPr/>
+        </p:nvSpPr>
+        <p:spPr>
+          <a:xfrm>
+            <a:off x="5831574" y="2937555"/>
+            <a:ext cx="1290846" cy="246221"/>
+          </a:xfrm>
+          <a:prstGeom prst="rect">
+            <a:avLst/>
+          </a:prstGeom>
+          <a:noFill/>
+          <a:ln>
+            <a:solidFill>
+              <a:schemeClr val="tx1"/>
+            </a:solidFill>
+          </a:ln>
+        </p:spPr>
+        <p:txBody>
+          <a:bodyPr wrap="square" rtlCol="0">
+            <a:spAutoFit/>
+          </a:bodyPr>
+          <a:lstStyle/>
+          <a:p>
+            <a:r>
+              <a:rPr lang="en-US" sz="1000" dirty="0"/>
+              <a:t>Update RI on map</a:t>
+            </a:r>
+            <a:endParaRPr lang="en-CA" sz="1000" dirty="0"/>
+          </a:p>
+        </p:txBody>
+      </p:sp>
     </p:spTree>
     <p:extLst>
       <p:ext uri="{BB962C8B-B14F-4D97-AF65-F5344CB8AC3E}">
@@ -11997,13 +12662,16 @@
 <file path=customXml/itemProps5.xml><?xml version="1.0" encoding="utf-8"?>
 <ds:datastoreItem xmlns:ds="http://schemas.openxmlformats.org/officeDocument/2006/customXml" ds:itemID="{9C876B4E-9239-4840-BF5E-B55D728E076B}">
   <ds:schemaRefs>
-    <ds:schemaRef ds:uri="2bec4a9b-cc25-42db-811b-8c1541308260"/>
+    <ds:schemaRef ds:uri="http://purl.org/dc/elements/1.1/"/>
+    <ds:schemaRef ds:uri="http://schemas.openxmlformats.org/package/2006/metadata/core-properties"/>
+    <ds:schemaRef ds:uri="http://www.w3.org/XML/1998/namespace"/>
+    <ds:schemaRef ds:uri="http://schemas.microsoft.com/office/2006/documentManagement/types"/>
+    <ds:schemaRef ds:uri="http://purl.org/dc/dcmitype/"/>
+    <ds:schemaRef ds:uri="http://schemas.microsoft.com/office/infopath/2007/PartnerControls"/>
+    <ds:schemaRef ds:uri="b73fb41d-4db5-49df-b889-ce373c40e3ec"/>
     <ds:schemaRef ds:uri="9daf4fce-efdb-4f08-985f-94c0458ac4da"/>
-    <ds:schemaRef ds:uri="b73fb41d-4db5-49df-b889-ce373c40e3ec"/>
     <ds:schemaRef ds:uri="http://schemas.microsoft.com/office/2006/metadata/properties"/>
-    <ds:schemaRef ds:uri="http://schemas.microsoft.com/office/infopath/2007/PartnerControls"/>
-    <ds:schemaRef ds:uri="http://schemas.microsoft.com/sharepoint/v3"/>
-    <ds:schemaRef ds:uri="http://schemas.microsoft.com/sharepoint/v4"/>
+    <ds:schemaRef ds:uri="http://purl.org/dc/terms/"/>
   </ds:schemaRefs>
 </ds:datastoreItem>
 </file>
</xml_diff>

<commit_message>
hack to hide points when RI is updated
</commit_message>
<xml_diff>
--- a/www/RI_GUIDE.pptx
+++ b/www/RI_GUIDE.pptx
@@ -5,7 +5,7 @@
     <p:sldMasterId id="2147483660" r:id="rId6"/>
   </p:sldMasterIdLst>
   <p:notesMasterIdLst>
-    <p:notesMasterId r:id="rId16"/>
+    <p:notesMasterId r:id="rId15"/>
   </p:notesMasterIdLst>
   <p:sldIdLst>
     <p:sldId id="256" r:id="rId7"/>
@@ -16,7 +16,6 @@
     <p:sldId id="261" r:id="rId12"/>
     <p:sldId id="262" r:id="rId13"/>
     <p:sldId id="263" r:id="rId14"/>
-    <p:sldId id="264" r:id="rId15"/>
   </p:sldIdLst>
   <p:sldSz cx="9144000" cy="5143500" type="screen16x9"/>
   <p:notesSz cx="6858000" cy="9144000"/>
@@ -1151,90 +1150,6 @@
     <p:extLst>
       <p:ext uri="{BB962C8B-B14F-4D97-AF65-F5344CB8AC3E}">
         <p14:creationId xmlns:p14="http://schemas.microsoft.com/office/powerpoint/2010/main" val="4120884689"/>
-      </p:ext>
-    </p:extLst>
-  </p:cSld>
-  <p:clrMapOvr>
-    <a:masterClrMapping/>
-  </p:clrMapOvr>
-</p:notes>
-</file>
-
-<file path=ppt/notesSlides/notesSlide9.xml><?xml version="1.0" encoding="utf-8"?>
-<p:notes xmlns:a="http://schemas.openxmlformats.org/drawingml/2006/main" xmlns:r="http://schemas.openxmlformats.org/officeDocument/2006/relationships" xmlns:p="http://schemas.openxmlformats.org/presentationml/2006/main">
-  <p:cSld>
-    <p:spTree>
-      <p:nvGrpSpPr>
-        <p:cNvPr id="1" name=""/>
-        <p:cNvGrpSpPr/>
-        <p:nvPr/>
-      </p:nvGrpSpPr>
-      <p:grpSpPr>
-        <a:xfrm>
-          <a:off x="0" y="0"/>
-          <a:ext cx="0" cy="0"/>
-          <a:chOff x="0" y="0"/>
-          <a:chExt cx="0" cy="0"/>
-        </a:xfrm>
-      </p:grpSpPr>
-      <p:sp>
-        <p:nvSpPr>
-          <p:cNvPr id="2" name="Slide Image Placeholder 1"/>
-          <p:cNvSpPr>
-            <a:spLocks noGrp="1" noRot="1" noChangeAspect="1"/>
-          </p:cNvSpPr>
-          <p:nvPr>
-            <p:ph type="sldImg"/>
-          </p:nvPr>
-        </p:nvSpPr>
-        <p:spPr/>
-      </p:sp>
-      <p:sp>
-        <p:nvSpPr>
-          <p:cNvPr id="3" name="Notes Placeholder 2"/>
-          <p:cNvSpPr>
-            <a:spLocks noGrp="1"/>
-          </p:cNvSpPr>
-          <p:nvPr>
-            <p:ph type="body" idx="1"/>
-          </p:nvPr>
-        </p:nvSpPr>
-        <p:spPr/>
-        <p:txBody>
-          <a:bodyPr/>
-          <a:lstStyle/>
-          <a:p>
-            <a:endParaRPr lang="en-CA"/>
-          </a:p>
-        </p:txBody>
-      </p:sp>
-      <p:sp>
-        <p:nvSpPr>
-          <p:cNvPr id="4" name="Slide Number Placeholder 3"/>
-          <p:cNvSpPr>
-            <a:spLocks noGrp="1"/>
-          </p:cNvSpPr>
-          <p:nvPr>
-            <p:ph type="sldNum" sz="quarter" idx="5"/>
-          </p:nvPr>
-        </p:nvSpPr>
-        <p:spPr/>
-        <p:txBody>
-          <a:bodyPr/>
-          <a:lstStyle/>
-          <a:p>
-            <a:fld id="{707FE74B-307F-4064-955D-4424C3D9D715}" type="slidenum">
-              <a:rPr lang="en-CA" smtClean="0"/>
-              <a:t>9</a:t>
-            </a:fld>
-            <a:endParaRPr lang="en-CA"/>
-          </a:p>
-        </p:txBody>
-      </p:sp>
-    </p:spTree>
-    <p:extLst>
-      <p:ext uri="{BB962C8B-B14F-4D97-AF65-F5344CB8AC3E}">
-        <p14:creationId xmlns:p14="http://schemas.microsoft.com/office/powerpoint/2010/main" val="4118420621"/>
       </p:ext>
     </p:extLst>
   </p:cSld>
@@ -11135,7 +11050,7 @@
           <a:p>
             <a:r>
               <a:rPr lang="en-US" dirty="0"/>
-              <a:t>RI BUILDER UI</a:t>
+              <a:t>RI BUILDER</a:t>
             </a:r>
             <a:endParaRPr lang="en-CA" dirty="0"/>
           </a:p>
@@ -11275,14 +11190,13 @@
           </p:cNvPr>
           <p:cNvCxnSpPr>
             <a:cxnSpLocks/>
-            <a:stCxn id="34" idx="3"/>
           </p:cNvCxnSpPr>
           <p:nvPr/>
         </p:nvCxnSpPr>
         <p:spPr>
           <a:xfrm>
-            <a:off x="7388087" y="1745517"/>
-            <a:ext cx="399634" cy="0"/>
+            <a:off x="7116417" y="1818402"/>
+            <a:ext cx="616226" cy="6627"/>
           </a:xfrm>
           <a:prstGeom prst="straightConnector1">
             <a:avLst/>
@@ -11317,14 +11231,13 @@
           </p:cNvPr>
           <p:cNvCxnSpPr>
             <a:cxnSpLocks/>
-            <a:stCxn id="41" idx="2"/>
           </p:cNvCxnSpPr>
           <p:nvPr/>
         </p:nvCxnSpPr>
         <p:spPr>
           <a:xfrm>
-            <a:off x="6289817" y="3893973"/>
-            <a:ext cx="6626" cy="515287"/>
+            <a:off x="6614491" y="3933682"/>
+            <a:ext cx="0" cy="475578"/>
           </a:xfrm>
           <a:prstGeom prst="straightConnector1">
             <a:avLst/>
@@ -11365,8 +11278,8 @@
         </p:nvCxnSpPr>
         <p:spPr>
           <a:xfrm flipH="1">
-            <a:off x="3054626" y="3675361"/>
-            <a:ext cx="1380714" cy="766850"/>
+            <a:off x="2759764" y="3675361"/>
+            <a:ext cx="1675576" cy="756123"/>
           </a:xfrm>
           <a:prstGeom prst="straightConnector1">
             <a:avLst/>
@@ -11535,8 +11448,8 @@
         </p:nvSpPr>
         <p:spPr>
           <a:xfrm>
-            <a:off x="6493153" y="1545462"/>
-            <a:ext cx="894934" cy="400110"/>
+            <a:off x="6334127" y="1701918"/>
+            <a:ext cx="782290" cy="246221"/>
           </a:xfrm>
           <a:prstGeom prst="rect">
             <a:avLst/>
@@ -11556,7 +11469,7 @@
           <a:p>
             <a:r>
               <a:rPr lang="en-US" sz="1000" dirty="0"/>
-              <a:t>View layers one at a time</a:t>
+              <a:t>View layers</a:t>
             </a:r>
             <a:endParaRPr lang="en-CA" sz="1000" dirty="0"/>
           </a:p>
@@ -11699,7 +11612,7 @@
         </p:nvSpPr>
         <p:spPr>
           <a:xfrm>
-            <a:off x="5887695" y="3647752"/>
+            <a:off x="6212369" y="3647752"/>
             <a:ext cx="804244" cy="246221"/>
           </a:xfrm>
           <a:prstGeom prst="rect">
@@ -11808,1069 +11721,10 @@
           </a:p>
         </p:txBody>
       </p:sp>
-      <p:cxnSp>
-        <p:nvCxnSpPr>
-          <p:cNvPr id="2" name="Straight Arrow Connector 1">
-            <a:extLst>
-              <a:ext uri="{FF2B5EF4-FFF2-40B4-BE49-F238E27FC236}">
-                <a16:creationId xmlns:a16="http://schemas.microsoft.com/office/drawing/2014/main" id="{992F9629-9CDD-4C3F-8379-ED086709FFE1}"/>
-              </a:ext>
-            </a:extLst>
-          </p:cNvPr>
-          <p:cNvCxnSpPr>
-            <a:cxnSpLocks/>
-          </p:cNvCxnSpPr>
-          <p:nvPr/>
-        </p:nvCxnSpPr>
-        <p:spPr>
-          <a:xfrm flipV="1">
-            <a:off x="7887115" y="3346246"/>
-            <a:ext cx="0" cy="301506"/>
-          </a:xfrm>
-          <a:prstGeom prst="straightConnector1">
-            <a:avLst/>
-          </a:prstGeom>
-          <a:ln>
-            <a:tailEnd type="triangle"/>
-          </a:ln>
-        </p:spPr>
-        <p:style>
-          <a:lnRef idx="1">
-            <a:schemeClr val="dk1"/>
-          </a:lnRef>
-          <a:fillRef idx="0">
-            <a:schemeClr val="dk1"/>
-          </a:fillRef>
-          <a:effectRef idx="0">
-            <a:schemeClr val="dk1"/>
-          </a:effectRef>
-          <a:fontRef idx="minor">
-            <a:schemeClr val="tx1"/>
-          </a:fontRef>
-        </p:style>
-      </p:cxnSp>
-      <p:sp>
-        <p:nvSpPr>
-          <p:cNvPr id="15" name="TextBox 14">
-            <a:extLst>
-              <a:ext uri="{FF2B5EF4-FFF2-40B4-BE49-F238E27FC236}">
-                <a16:creationId xmlns:a16="http://schemas.microsoft.com/office/drawing/2014/main" id="{A77912EE-E3EB-4FD9-AFE4-9FBBB16A4ACF}"/>
-              </a:ext>
-            </a:extLst>
-          </p:cNvPr>
-          <p:cNvSpPr txBox="1"/>
-          <p:nvPr/>
-        </p:nvSpPr>
-        <p:spPr>
-          <a:xfrm>
-            <a:off x="7177710" y="3653312"/>
-            <a:ext cx="1418809" cy="400110"/>
-          </a:xfrm>
-          <a:prstGeom prst="rect">
-            <a:avLst/>
-          </a:prstGeom>
-          <a:noFill/>
-          <a:ln>
-            <a:solidFill>
-              <a:schemeClr val="tx1"/>
-            </a:solidFill>
-          </a:ln>
-        </p:spPr>
-        <p:txBody>
-          <a:bodyPr wrap="square" rtlCol="0">
-            <a:spAutoFit/>
-          </a:bodyPr>
-          <a:lstStyle/>
-          <a:p>
-            <a:r>
-              <a:rPr lang="en-US" sz="1000" dirty="0"/>
-              <a:t>Click on mapped points to view RI cell value </a:t>
-            </a:r>
-            <a:endParaRPr lang="en-CA" sz="1000" dirty="0"/>
-          </a:p>
-        </p:txBody>
-      </p:sp>
-      <p:sp>
-        <p:nvSpPr>
-          <p:cNvPr id="20" name="TextBox 19">
-            <a:extLst>
-              <a:ext uri="{FF2B5EF4-FFF2-40B4-BE49-F238E27FC236}">
-                <a16:creationId xmlns:a16="http://schemas.microsoft.com/office/drawing/2014/main" id="{1F905E07-814C-6A9C-FAC9-655A4A9F5EDC}"/>
-              </a:ext>
-            </a:extLst>
-          </p:cNvPr>
-          <p:cNvSpPr txBox="1"/>
-          <p:nvPr/>
-        </p:nvSpPr>
-        <p:spPr>
-          <a:xfrm>
-            <a:off x="6787181" y="2490202"/>
-            <a:ext cx="1000540" cy="246221"/>
-          </a:xfrm>
-          <a:prstGeom prst="rect">
-            <a:avLst/>
-          </a:prstGeom>
-          <a:noFill/>
-          <a:ln>
-            <a:solidFill>
-              <a:schemeClr val="tx1"/>
-            </a:solidFill>
-          </a:ln>
-        </p:spPr>
-        <p:txBody>
-          <a:bodyPr wrap="square" rtlCol="0">
-            <a:spAutoFit/>
-          </a:bodyPr>
-          <a:lstStyle/>
-          <a:p>
-            <a:r>
-              <a:rPr lang="en-US" sz="1000" dirty="0"/>
-              <a:t>Toggle overlays</a:t>
-            </a:r>
-            <a:endParaRPr lang="en-CA" sz="1000" dirty="0"/>
-          </a:p>
-        </p:txBody>
-      </p:sp>
-      <p:cxnSp>
-        <p:nvCxnSpPr>
-          <p:cNvPr id="21" name="Straight Arrow Connector 20">
-            <a:extLst>
-              <a:ext uri="{FF2B5EF4-FFF2-40B4-BE49-F238E27FC236}">
-                <a16:creationId xmlns:a16="http://schemas.microsoft.com/office/drawing/2014/main" id="{CEF8C428-8A3E-48FB-E219-7579D958B263}"/>
-              </a:ext>
-            </a:extLst>
-          </p:cNvPr>
-          <p:cNvCxnSpPr>
-            <a:cxnSpLocks/>
-          </p:cNvCxnSpPr>
-          <p:nvPr/>
-        </p:nvCxnSpPr>
-        <p:spPr>
-          <a:xfrm>
-            <a:off x="7388087" y="2741983"/>
-            <a:ext cx="399634" cy="404001"/>
-          </a:xfrm>
-          <a:prstGeom prst="straightConnector1">
-            <a:avLst/>
-          </a:prstGeom>
-          <a:ln>
-            <a:tailEnd type="triangle"/>
-          </a:ln>
-        </p:spPr>
-        <p:style>
-          <a:lnRef idx="1">
-            <a:schemeClr val="dk1"/>
-          </a:lnRef>
-          <a:fillRef idx="0">
-            <a:schemeClr val="dk1"/>
-          </a:fillRef>
-          <a:effectRef idx="0">
-            <a:schemeClr val="dk1"/>
-          </a:effectRef>
-          <a:fontRef idx="minor">
-            <a:schemeClr val="tx1"/>
-          </a:fontRef>
-        </p:style>
-      </p:cxnSp>
     </p:spTree>
     <p:extLst>
       <p:ext uri="{BB962C8B-B14F-4D97-AF65-F5344CB8AC3E}">
         <p14:creationId xmlns:p14="http://schemas.microsoft.com/office/powerpoint/2010/main" val="1177813972"/>
-      </p:ext>
-    </p:extLst>
-  </p:cSld>
-  <p:clrMapOvr>
-    <a:masterClrMapping/>
-  </p:clrMapOvr>
-</p:sld>
-</file>
-
-<file path=ppt/slides/slide9.xml><?xml version="1.0" encoding="utf-8"?>
-<p:sld xmlns:a="http://schemas.openxmlformats.org/drawingml/2006/main" xmlns:r="http://schemas.openxmlformats.org/officeDocument/2006/relationships" xmlns:p="http://schemas.openxmlformats.org/presentationml/2006/main">
-  <p:cSld>
-    <p:spTree>
-      <p:nvGrpSpPr>
-        <p:cNvPr id="1" name=""/>
-        <p:cNvGrpSpPr/>
-        <p:nvPr/>
-      </p:nvGrpSpPr>
-      <p:grpSpPr>
-        <a:xfrm>
-          <a:off x="0" y="0"/>
-          <a:ext cx="0" cy="0"/>
-          <a:chOff x="0" y="0"/>
-          <a:chExt cx="0" cy="0"/>
-        </a:xfrm>
-      </p:grpSpPr>
-      <p:pic>
-        <p:nvPicPr>
-          <p:cNvPr id="5" name="Picture 4">
-            <a:extLst>
-              <a:ext uri="{FF2B5EF4-FFF2-40B4-BE49-F238E27FC236}">
-                <a16:creationId xmlns:a16="http://schemas.microsoft.com/office/drawing/2014/main" id="{A5BD1FFB-C6C9-B9CC-9710-4314A5417040}"/>
-              </a:ext>
-            </a:extLst>
-          </p:cNvPr>
-          <p:cNvPicPr>
-            <a:picLocks noChangeAspect="1"/>
-          </p:cNvPicPr>
-          <p:nvPr/>
-        </p:nvPicPr>
-        <p:blipFill>
-          <a:blip r:embed="rId3">
-            <a:alphaModFix/>
-            <a:extLst>
-              <a:ext uri="{BEBA8EAE-BF5A-486C-A8C5-ECC9F3942E4B}">
-                <a14:imgProps xmlns:a14="http://schemas.microsoft.com/office/drawing/2010/main">
-                  <a14:imgLayer r:embed="rId4">
-                    <a14:imgEffect>
-                      <a14:backgroundRemoval t="10000" b="90000" l="10000" r="90000"/>
-                    </a14:imgEffect>
-                  </a14:imgLayer>
-                </a14:imgProps>
-              </a:ext>
-              <a:ext uri="{28A0092B-C50C-407E-A947-70E740481C1C}">
-                <a14:useLocalDpi xmlns:a14="http://schemas.microsoft.com/office/drawing/2010/main" val="0"/>
-              </a:ext>
-            </a:extLst>
-          </a:blip>
-          <a:srcRect/>
-          <a:stretch/>
-        </p:blipFill>
-        <p:spPr>
-          <a:xfrm>
-            <a:off x="4592782" y="393106"/>
-            <a:ext cx="3377537" cy="4370936"/>
-          </a:xfrm>
-          <a:prstGeom prst="rect">
-            <a:avLst/>
-          </a:prstGeom>
-        </p:spPr>
-      </p:pic>
-      <p:sp>
-        <p:nvSpPr>
-          <p:cNvPr id="6" name="Title 5">
-            <a:extLst>
-              <a:ext uri="{FF2B5EF4-FFF2-40B4-BE49-F238E27FC236}">
-                <a16:creationId xmlns:a16="http://schemas.microsoft.com/office/drawing/2014/main" id="{EA1DA570-A070-3FC0-D489-3B7DA96EA1F3}"/>
-              </a:ext>
-            </a:extLst>
-          </p:cNvPr>
-          <p:cNvSpPr>
-            <a:spLocks noGrp="1"/>
-          </p:cNvSpPr>
-          <p:nvPr>
-            <p:ph type="title"/>
-          </p:nvPr>
-        </p:nvSpPr>
-        <p:spPr/>
-        <p:txBody>
-          <a:bodyPr/>
-          <a:lstStyle/>
-          <a:p>
-            <a:r>
-              <a:rPr lang="en-US" dirty="0"/>
-              <a:t>NEXT STEPS</a:t>
-            </a:r>
-            <a:endParaRPr lang="en-CA" dirty="0"/>
-          </a:p>
-        </p:txBody>
-      </p:sp>
-      <p:sp>
-        <p:nvSpPr>
-          <p:cNvPr id="8" name="Content Placeholder 7">
-            <a:extLst>
-              <a:ext uri="{FF2B5EF4-FFF2-40B4-BE49-F238E27FC236}">
-                <a16:creationId xmlns:a16="http://schemas.microsoft.com/office/drawing/2014/main" id="{A5C65A31-31C6-888F-AF71-FAD7B2A5AEB9}"/>
-              </a:ext>
-            </a:extLst>
-          </p:cNvPr>
-          <p:cNvSpPr>
-            <a:spLocks noGrp="1"/>
-          </p:cNvSpPr>
-          <p:nvPr>
-            <p:ph idx="1"/>
-          </p:nvPr>
-        </p:nvSpPr>
-        <p:spPr>
-          <a:xfrm>
-            <a:off x="628650" y="759884"/>
-            <a:ext cx="8402707" cy="824016"/>
-          </a:xfrm>
-        </p:spPr>
-        <p:txBody>
-          <a:bodyPr>
-            <a:normAutofit/>
-          </a:bodyPr>
-          <a:lstStyle/>
-          <a:p>
-            <a:pPr marL="0" indent="0">
-              <a:buNone/>
-            </a:pPr>
-            <a:endParaRPr lang="en-US" dirty="0"/>
-          </a:p>
-          <a:p>
-            <a:endParaRPr lang="en-US" dirty="0"/>
-          </a:p>
-          <a:p>
-            <a:pPr marL="0" indent="0">
-              <a:buNone/>
-            </a:pPr>
-            <a:endParaRPr lang="en-CA" dirty="0"/>
-          </a:p>
-        </p:txBody>
-      </p:sp>
-      <p:sp>
-        <p:nvSpPr>
-          <p:cNvPr id="4" name="Content Placeholder 7">
-            <a:extLst>
-              <a:ext uri="{FF2B5EF4-FFF2-40B4-BE49-F238E27FC236}">
-                <a16:creationId xmlns:a16="http://schemas.microsoft.com/office/drawing/2014/main" id="{66C7D8DE-13B1-FB63-DBC4-BD613D347951}"/>
-              </a:ext>
-            </a:extLst>
-          </p:cNvPr>
-          <p:cNvSpPr txBox="1">
-            <a:spLocks/>
-          </p:cNvSpPr>
-          <p:nvPr/>
-        </p:nvSpPr>
-        <p:spPr>
-          <a:xfrm>
-            <a:off x="628650" y="3374234"/>
-            <a:ext cx="7886700" cy="824016"/>
-          </a:xfrm>
-          <a:prstGeom prst="rect">
-            <a:avLst/>
-          </a:prstGeom>
-        </p:spPr>
-        <p:txBody>
-          <a:bodyPr vert="horz" lIns="68580" tIns="34290" rIns="68580" bIns="34290" rtlCol="0">
-            <a:normAutofit/>
-          </a:bodyPr>
-          <a:lstStyle>
-            <a:lvl1pPr marL="171450" indent="-171450" algn="l" defTabSz="685800" rtl="0" eaLnBrk="1" latinLnBrk="0" hangingPunct="1">
-              <a:lnSpc>
-                <a:spcPct val="90000"/>
-              </a:lnSpc>
-              <a:spcBef>
-                <a:spcPts val="750"/>
-              </a:spcBef>
-              <a:buFont typeface="Arial" panose="020B0604020202020204" pitchFamily="34" charset="0"/>
-              <a:buChar char="•"/>
-              <a:defRPr sz="2100" kern="1200">
-                <a:solidFill>
-                  <a:schemeClr val="bg2">
-                    <a:lumMod val="25000"/>
-                  </a:schemeClr>
-                </a:solidFill>
-                <a:latin typeface="Verdana"/>
-                <a:ea typeface="+mn-ea"/>
-                <a:cs typeface="Verdana"/>
-              </a:defRPr>
-            </a:lvl1pPr>
-            <a:lvl2pPr marL="514350" indent="-171450" algn="l" defTabSz="685800" rtl="0" eaLnBrk="1" latinLnBrk="0" hangingPunct="1">
-              <a:lnSpc>
-                <a:spcPct val="90000"/>
-              </a:lnSpc>
-              <a:spcBef>
-                <a:spcPts val="375"/>
-              </a:spcBef>
-              <a:buFont typeface="Arial" panose="020B0604020202020204" pitchFamily="34" charset="0"/>
-              <a:buChar char="•"/>
-              <a:defRPr sz="1800" kern="1200">
-                <a:solidFill>
-                  <a:schemeClr val="bg2">
-                    <a:lumMod val="25000"/>
-                  </a:schemeClr>
-                </a:solidFill>
-                <a:latin typeface="Verdana"/>
-                <a:ea typeface="+mn-ea"/>
-                <a:cs typeface="Verdana"/>
-              </a:defRPr>
-            </a:lvl2pPr>
-            <a:lvl3pPr marL="857250" indent="-171450" algn="l" defTabSz="685800" rtl="0" eaLnBrk="1" latinLnBrk="0" hangingPunct="1">
-              <a:lnSpc>
-                <a:spcPct val="90000"/>
-              </a:lnSpc>
-              <a:spcBef>
-                <a:spcPts val="375"/>
-              </a:spcBef>
-              <a:buFont typeface="Arial" panose="020B0604020202020204" pitchFamily="34" charset="0"/>
-              <a:buChar char="•"/>
-              <a:defRPr sz="1500" kern="1200">
-                <a:solidFill>
-                  <a:schemeClr val="bg2">
-                    <a:lumMod val="25000"/>
-                  </a:schemeClr>
-                </a:solidFill>
-                <a:latin typeface="Verdana"/>
-                <a:ea typeface="+mn-ea"/>
-                <a:cs typeface="Verdana"/>
-              </a:defRPr>
-            </a:lvl3pPr>
-            <a:lvl4pPr marL="1200150" indent="-171450" algn="l" defTabSz="685800" rtl="0" eaLnBrk="1" latinLnBrk="0" hangingPunct="1">
-              <a:lnSpc>
-                <a:spcPct val="90000"/>
-              </a:lnSpc>
-              <a:spcBef>
-                <a:spcPts val="375"/>
-              </a:spcBef>
-              <a:buFont typeface="Arial" panose="020B0604020202020204" pitchFamily="34" charset="0"/>
-              <a:buChar char="•"/>
-              <a:defRPr sz="1400" kern="1200">
-                <a:solidFill>
-                  <a:schemeClr val="bg2">
-                    <a:lumMod val="25000"/>
-                  </a:schemeClr>
-                </a:solidFill>
-                <a:latin typeface="Verdana"/>
-                <a:ea typeface="+mn-ea"/>
-                <a:cs typeface="Verdana"/>
-              </a:defRPr>
-            </a:lvl4pPr>
-            <a:lvl5pPr marL="1543050" indent="-171450" algn="l" defTabSz="685800" rtl="0" eaLnBrk="1" latinLnBrk="0" hangingPunct="1">
-              <a:lnSpc>
-                <a:spcPct val="90000"/>
-              </a:lnSpc>
-              <a:spcBef>
-                <a:spcPts val="375"/>
-              </a:spcBef>
-              <a:buFont typeface="Arial" panose="020B0604020202020204" pitchFamily="34" charset="0"/>
-              <a:buChar char="•"/>
-              <a:defRPr sz="1400" kern="1200">
-                <a:solidFill>
-                  <a:schemeClr val="bg2">
-                    <a:lumMod val="25000"/>
-                  </a:schemeClr>
-                </a:solidFill>
-                <a:latin typeface="Verdana"/>
-                <a:ea typeface="+mn-ea"/>
-                <a:cs typeface="Verdana"/>
-              </a:defRPr>
-            </a:lvl5pPr>
-            <a:lvl6pPr marL="1885950" indent="-171450" algn="l" defTabSz="685800" rtl="0" eaLnBrk="1" latinLnBrk="0" hangingPunct="1">
-              <a:lnSpc>
-                <a:spcPct val="90000"/>
-              </a:lnSpc>
-              <a:spcBef>
-                <a:spcPts val="375"/>
-              </a:spcBef>
-              <a:buFont typeface="Arial" panose="020B0604020202020204" pitchFamily="34" charset="0"/>
-              <a:buChar char="•"/>
-              <a:defRPr sz="1400" kern="1200">
-                <a:solidFill>
-                  <a:schemeClr val="tx1"/>
-                </a:solidFill>
-                <a:latin typeface="+mn-lt"/>
-                <a:ea typeface="+mn-ea"/>
-                <a:cs typeface="+mn-cs"/>
-              </a:defRPr>
-            </a:lvl6pPr>
-            <a:lvl7pPr marL="2228850" indent="-171450" algn="l" defTabSz="685800" rtl="0" eaLnBrk="1" latinLnBrk="0" hangingPunct="1">
-              <a:lnSpc>
-                <a:spcPct val="90000"/>
-              </a:lnSpc>
-              <a:spcBef>
-                <a:spcPts val="375"/>
-              </a:spcBef>
-              <a:buFont typeface="Arial" panose="020B0604020202020204" pitchFamily="34" charset="0"/>
-              <a:buChar char="•"/>
-              <a:defRPr sz="1400" kern="1200">
-                <a:solidFill>
-                  <a:schemeClr val="tx1"/>
-                </a:solidFill>
-                <a:latin typeface="+mn-lt"/>
-                <a:ea typeface="+mn-ea"/>
-                <a:cs typeface="+mn-cs"/>
-              </a:defRPr>
-            </a:lvl7pPr>
-            <a:lvl8pPr marL="2571750" indent="-171450" algn="l" defTabSz="685800" rtl="0" eaLnBrk="1" latinLnBrk="0" hangingPunct="1">
-              <a:lnSpc>
-                <a:spcPct val="90000"/>
-              </a:lnSpc>
-              <a:spcBef>
-                <a:spcPts val="375"/>
-              </a:spcBef>
-              <a:buFont typeface="Arial" panose="020B0604020202020204" pitchFamily="34" charset="0"/>
-              <a:buChar char="•"/>
-              <a:defRPr sz="1400" kern="1200">
-                <a:solidFill>
-                  <a:schemeClr val="tx1"/>
-                </a:solidFill>
-                <a:latin typeface="+mn-lt"/>
-                <a:ea typeface="+mn-ea"/>
-                <a:cs typeface="+mn-cs"/>
-              </a:defRPr>
-            </a:lvl8pPr>
-            <a:lvl9pPr marL="2914650" indent="-171450" algn="l" defTabSz="685800" rtl="0" eaLnBrk="1" latinLnBrk="0" hangingPunct="1">
-              <a:lnSpc>
-                <a:spcPct val="90000"/>
-              </a:lnSpc>
-              <a:spcBef>
-                <a:spcPts val="375"/>
-              </a:spcBef>
-              <a:buFont typeface="Arial" panose="020B0604020202020204" pitchFamily="34" charset="0"/>
-              <a:buChar char="•"/>
-              <a:defRPr sz="1400" kern="1200">
-                <a:solidFill>
-                  <a:schemeClr val="tx1"/>
-                </a:solidFill>
-                <a:latin typeface="+mn-lt"/>
-                <a:ea typeface="+mn-ea"/>
-                <a:cs typeface="+mn-cs"/>
-              </a:defRPr>
-            </a:lvl9pPr>
-          </a:lstStyle>
-          <a:p>
-            <a:pPr marL="0" indent="0">
-              <a:lnSpc>
-                <a:spcPct val="150000"/>
-              </a:lnSpc>
-              <a:buFont typeface="Arial" panose="020B0604020202020204" pitchFamily="34" charset="0"/>
-              <a:buNone/>
-            </a:pPr>
-            <a:endParaRPr lang="en-US" dirty="0"/>
-          </a:p>
-          <a:p>
-            <a:pPr marL="0" indent="0">
-              <a:buFont typeface="Arial" panose="020B0604020202020204" pitchFamily="34" charset="0"/>
-              <a:buNone/>
-            </a:pPr>
-            <a:endParaRPr lang="en-US" dirty="0"/>
-          </a:p>
-          <a:p>
-            <a:pPr marL="0" indent="0">
-              <a:buFont typeface="Arial" panose="020B0604020202020204" pitchFamily="34" charset="0"/>
-              <a:buNone/>
-            </a:pPr>
-            <a:endParaRPr lang="en-US" dirty="0"/>
-          </a:p>
-          <a:p>
-            <a:pPr marL="0" indent="0">
-              <a:buFont typeface="Arial" panose="020B0604020202020204" pitchFamily="34" charset="0"/>
-              <a:buNone/>
-            </a:pPr>
-            <a:endParaRPr lang="en-CA" dirty="0"/>
-          </a:p>
-        </p:txBody>
-      </p:sp>
-      <p:sp>
-        <p:nvSpPr>
-          <p:cNvPr id="2" name="Content Placeholder 7">
-            <a:extLst>
-              <a:ext uri="{FF2B5EF4-FFF2-40B4-BE49-F238E27FC236}">
-                <a16:creationId xmlns:a16="http://schemas.microsoft.com/office/drawing/2014/main" id="{5DAE791B-F751-2BDC-D8A5-62ED5AE64703}"/>
-              </a:ext>
-            </a:extLst>
-          </p:cNvPr>
-          <p:cNvSpPr txBox="1">
-            <a:spLocks/>
-          </p:cNvSpPr>
-          <p:nvPr/>
-        </p:nvSpPr>
-        <p:spPr>
-          <a:xfrm>
-            <a:off x="628649" y="1118462"/>
-            <a:ext cx="3988711" cy="3885114"/>
-          </a:xfrm>
-          <a:prstGeom prst="rect">
-            <a:avLst/>
-          </a:prstGeom>
-        </p:spPr>
-        <p:txBody>
-          <a:bodyPr vert="horz" lIns="68580" tIns="34290" rIns="68580" bIns="34290" rtlCol="0">
-            <a:normAutofit fontScale="92500"/>
-          </a:bodyPr>
-          <a:lstStyle>
-            <a:lvl1pPr marL="171450" indent="-171450" algn="l" defTabSz="685800" rtl="0" eaLnBrk="1" latinLnBrk="0" hangingPunct="1">
-              <a:lnSpc>
-                <a:spcPct val="90000"/>
-              </a:lnSpc>
-              <a:spcBef>
-                <a:spcPts val="750"/>
-              </a:spcBef>
-              <a:buFont typeface="Arial" panose="020B0604020202020204" pitchFamily="34" charset="0"/>
-              <a:buChar char="•"/>
-              <a:defRPr sz="2100" kern="1200">
-                <a:solidFill>
-                  <a:schemeClr val="bg2">
-                    <a:lumMod val="25000"/>
-                  </a:schemeClr>
-                </a:solidFill>
-                <a:latin typeface="Verdana"/>
-                <a:ea typeface="+mn-ea"/>
-                <a:cs typeface="Verdana"/>
-              </a:defRPr>
-            </a:lvl1pPr>
-            <a:lvl2pPr marL="514350" indent="-171450" algn="l" defTabSz="685800" rtl="0" eaLnBrk="1" latinLnBrk="0" hangingPunct="1">
-              <a:lnSpc>
-                <a:spcPct val="90000"/>
-              </a:lnSpc>
-              <a:spcBef>
-                <a:spcPts val="375"/>
-              </a:spcBef>
-              <a:buFont typeface="Arial" panose="020B0604020202020204" pitchFamily="34" charset="0"/>
-              <a:buChar char="•"/>
-              <a:defRPr sz="1800" kern="1200">
-                <a:solidFill>
-                  <a:schemeClr val="bg2">
-                    <a:lumMod val="25000"/>
-                  </a:schemeClr>
-                </a:solidFill>
-                <a:latin typeface="Verdana"/>
-                <a:ea typeface="+mn-ea"/>
-                <a:cs typeface="Verdana"/>
-              </a:defRPr>
-            </a:lvl2pPr>
-            <a:lvl3pPr marL="857250" indent="-171450" algn="l" defTabSz="685800" rtl="0" eaLnBrk="1" latinLnBrk="0" hangingPunct="1">
-              <a:lnSpc>
-                <a:spcPct val="90000"/>
-              </a:lnSpc>
-              <a:spcBef>
-                <a:spcPts val="375"/>
-              </a:spcBef>
-              <a:buFont typeface="Arial" panose="020B0604020202020204" pitchFamily="34" charset="0"/>
-              <a:buChar char="•"/>
-              <a:defRPr sz="1500" kern="1200">
-                <a:solidFill>
-                  <a:schemeClr val="bg2">
-                    <a:lumMod val="25000"/>
-                  </a:schemeClr>
-                </a:solidFill>
-                <a:latin typeface="Verdana"/>
-                <a:ea typeface="+mn-ea"/>
-                <a:cs typeface="Verdana"/>
-              </a:defRPr>
-            </a:lvl3pPr>
-            <a:lvl4pPr marL="1200150" indent="-171450" algn="l" defTabSz="685800" rtl="0" eaLnBrk="1" latinLnBrk="0" hangingPunct="1">
-              <a:lnSpc>
-                <a:spcPct val="90000"/>
-              </a:lnSpc>
-              <a:spcBef>
-                <a:spcPts val="375"/>
-              </a:spcBef>
-              <a:buFont typeface="Arial" panose="020B0604020202020204" pitchFamily="34" charset="0"/>
-              <a:buChar char="•"/>
-              <a:defRPr sz="1400" kern="1200">
-                <a:solidFill>
-                  <a:schemeClr val="bg2">
-                    <a:lumMod val="25000"/>
-                  </a:schemeClr>
-                </a:solidFill>
-                <a:latin typeface="Verdana"/>
-                <a:ea typeface="+mn-ea"/>
-                <a:cs typeface="Verdana"/>
-              </a:defRPr>
-            </a:lvl4pPr>
-            <a:lvl5pPr marL="1543050" indent="-171450" algn="l" defTabSz="685800" rtl="0" eaLnBrk="1" latinLnBrk="0" hangingPunct="1">
-              <a:lnSpc>
-                <a:spcPct val="90000"/>
-              </a:lnSpc>
-              <a:spcBef>
-                <a:spcPts val="375"/>
-              </a:spcBef>
-              <a:buFont typeface="Arial" panose="020B0604020202020204" pitchFamily="34" charset="0"/>
-              <a:buChar char="•"/>
-              <a:defRPr sz="1400" kern="1200">
-                <a:solidFill>
-                  <a:schemeClr val="bg2">
-                    <a:lumMod val="25000"/>
-                  </a:schemeClr>
-                </a:solidFill>
-                <a:latin typeface="Verdana"/>
-                <a:ea typeface="+mn-ea"/>
-                <a:cs typeface="Verdana"/>
-              </a:defRPr>
-            </a:lvl5pPr>
-            <a:lvl6pPr marL="1885950" indent="-171450" algn="l" defTabSz="685800" rtl="0" eaLnBrk="1" latinLnBrk="0" hangingPunct="1">
-              <a:lnSpc>
-                <a:spcPct val="90000"/>
-              </a:lnSpc>
-              <a:spcBef>
-                <a:spcPts val="375"/>
-              </a:spcBef>
-              <a:buFont typeface="Arial" panose="020B0604020202020204" pitchFamily="34" charset="0"/>
-              <a:buChar char="•"/>
-              <a:defRPr sz="1400" kern="1200">
-                <a:solidFill>
-                  <a:schemeClr val="tx1"/>
-                </a:solidFill>
-                <a:latin typeface="+mn-lt"/>
-                <a:ea typeface="+mn-ea"/>
-                <a:cs typeface="+mn-cs"/>
-              </a:defRPr>
-            </a:lvl6pPr>
-            <a:lvl7pPr marL="2228850" indent="-171450" algn="l" defTabSz="685800" rtl="0" eaLnBrk="1" latinLnBrk="0" hangingPunct="1">
-              <a:lnSpc>
-                <a:spcPct val="90000"/>
-              </a:lnSpc>
-              <a:spcBef>
-                <a:spcPts val="375"/>
-              </a:spcBef>
-              <a:buFont typeface="Arial" panose="020B0604020202020204" pitchFamily="34" charset="0"/>
-              <a:buChar char="•"/>
-              <a:defRPr sz="1400" kern="1200">
-                <a:solidFill>
-                  <a:schemeClr val="tx1"/>
-                </a:solidFill>
-                <a:latin typeface="+mn-lt"/>
-                <a:ea typeface="+mn-ea"/>
-                <a:cs typeface="+mn-cs"/>
-              </a:defRPr>
-            </a:lvl7pPr>
-            <a:lvl8pPr marL="2571750" indent="-171450" algn="l" defTabSz="685800" rtl="0" eaLnBrk="1" latinLnBrk="0" hangingPunct="1">
-              <a:lnSpc>
-                <a:spcPct val="90000"/>
-              </a:lnSpc>
-              <a:spcBef>
-                <a:spcPts val="375"/>
-              </a:spcBef>
-              <a:buFont typeface="Arial" panose="020B0604020202020204" pitchFamily="34" charset="0"/>
-              <a:buChar char="•"/>
-              <a:defRPr sz="1400" kern="1200">
-                <a:solidFill>
-                  <a:schemeClr val="tx1"/>
-                </a:solidFill>
-                <a:latin typeface="+mn-lt"/>
-                <a:ea typeface="+mn-ea"/>
-                <a:cs typeface="+mn-cs"/>
-              </a:defRPr>
-            </a:lvl8pPr>
-            <a:lvl9pPr marL="2914650" indent="-171450" algn="l" defTabSz="685800" rtl="0" eaLnBrk="1" latinLnBrk="0" hangingPunct="1">
-              <a:lnSpc>
-                <a:spcPct val="90000"/>
-              </a:lnSpc>
-              <a:spcBef>
-                <a:spcPts val="375"/>
-              </a:spcBef>
-              <a:buFont typeface="Arial" panose="020B0604020202020204" pitchFamily="34" charset="0"/>
-              <a:buChar char="•"/>
-              <a:defRPr sz="1400" kern="1200">
-                <a:solidFill>
-                  <a:schemeClr val="tx1"/>
-                </a:solidFill>
-                <a:latin typeface="+mn-lt"/>
-                <a:ea typeface="+mn-ea"/>
-                <a:cs typeface="+mn-cs"/>
-              </a:defRPr>
-            </a:lvl9pPr>
-          </a:lstStyle>
-          <a:p>
-            <a:pPr>
-              <a:lnSpc>
-                <a:spcPct val="130000"/>
-              </a:lnSpc>
-            </a:pPr>
-            <a:r>
-              <a:rPr lang="en-US" sz="2000" dirty="0"/>
-              <a:t>Finding agreement on RI </a:t>
-            </a:r>
-            <a:r>
-              <a:rPr lang="en-US" sz="2000" b="1" dirty="0"/>
-              <a:t>definition</a:t>
-            </a:r>
-          </a:p>
-          <a:p>
-            <a:pPr>
-              <a:lnSpc>
-                <a:spcPct val="130000"/>
-              </a:lnSpc>
-            </a:pPr>
-            <a:r>
-              <a:rPr lang="en-US" sz="2000" dirty="0"/>
-              <a:t>Finding agreement on the RI</a:t>
-            </a:r>
-            <a:r>
-              <a:rPr lang="en-US" sz="2000" b="1" dirty="0"/>
-              <a:t> inputs</a:t>
-            </a:r>
-          </a:p>
-          <a:p>
-            <a:pPr>
-              <a:lnSpc>
-                <a:spcPct val="130000"/>
-              </a:lnSpc>
-            </a:pPr>
-            <a:r>
-              <a:rPr lang="en-US" sz="2000" dirty="0"/>
-              <a:t>Finding agreement on RI </a:t>
-            </a:r>
-            <a:r>
-              <a:rPr lang="en-US" sz="2000" b="1" dirty="0"/>
-              <a:t>weights</a:t>
-            </a:r>
-            <a:endParaRPr lang="en-US" sz="2000" dirty="0"/>
-          </a:p>
-          <a:p>
-            <a:pPr>
-              <a:lnSpc>
-                <a:spcPct val="130000"/>
-              </a:lnSpc>
-            </a:pPr>
-            <a:r>
-              <a:rPr lang="en-US" sz="2000" dirty="0"/>
-              <a:t>Communicating what RI is good at explaining and where it falls short (</a:t>
-            </a:r>
-            <a:r>
-              <a:rPr lang="en-US" sz="2000" b="1" dirty="0"/>
-              <a:t>limitations</a:t>
-            </a:r>
-            <a:r>
-              <a:rPr lang="en-US" sz="2000" dirty="0"/>
-              <a:t>)</a:t>
-            </a:r>
-          </a:p>
-          <a:p>
-            <a:pPr marL="0" indent="0">
-              <a:buFont typeface="Arial" panose="020B0604020202020204" pitchFamily="34" charset="0"/>
-              <a:buNone/>
-            </a:pPr>
-            <a:endParaRPr lang="en-US" dirty="0"/>
-          </a:p>
-          <a:p>
-            <a:pPr marL="0" indent="0">
-              <a:buFont typeface="Arial" panose="020B0604020202020204" pitchFamily="34" charset="0"/>
-              <a:buNone/>
-            </a:pPr>
-            <a:endParaRPr lang="en-US" dirty="0"/>
-          </a:p>
-          <a:p>
-            <a:pPr marL="0" indent="0">
-              <a:buFont typeface="Arial" panose="020B0604020202020204" pitchFamily="34" charset="0"/>
-              <a:buNone/>
-            </a:pPr>
-            <a:endParaRPr lang="en-US" dirty="0"/>
-          </a:p>
-          <a:p>
-            <a:pPr marL="0" indent="0">
-              <a:buFont typeface="Arial" panose="020B0604020202020204" pitchFamily="34" charset="0"/>
-              <a:buNone/>
-            </a:pPr>
-            <a:endParaRPr lang="en-US" dirty="0"/>
-          </a:p>
-          <a:p>
-            <a:pPr marL="0" indent="0">
-              <a:buFont typeface="Arial" panose="020B0604020202020204" pitchFamily="34" charset="0"/>
-              <a:buNone/>
-            </a:pPr>
-            <a:endParaRPr lang="en-US" dirty="0"/>
-          </a:p>
-          <a:p>
-            <a:pPr marL="0" indent="0">
-              <a:buFont typeface="Arial" panose="020B0604020202020204" pitchFamily="34" charset="0"/>
-              <a:buNone/>
-            </a:pPr>
-            <a:endParaRPr lang="en-US" dirty="0"/>
-          </a:p>
-          <a:p>
-            <a:pPr marL="0" indent="0">
-              <a:buFont typeface="Arial" panose="020B0604020202020204" pitchFamily="34" charset="0"/>
-              <a:buNone/>
-            </a:pPr>
-            <a:endParaRPr lang="en-CA" dirty="0"/>
-          </a:p>
-        </p:txBody>
-      </p:sp>
-      <p:sp>
-        <p:nvSpPr>
-          <p:cNvPr id="10" name="TextBox 9">
-            <a:extLst>
-              <a:ext uri="{FF2B5EF4-FFF2-40B4-BE49-F238E27FC236}">
-                <a16:creationId xmlns:a16="http://schemas.microsoft.com/office/drawing/2014/main" id="{9F54CBE6-2368-27E2-3B35-AF3A3B4C71B4}"/>
-              </a:ext>
-            </a:extLst>
-          </p:cNvPr>
-          <p:cNvSpPr txBox="1"/>
-          <p:nvPr/>
-        </p:nvSpPr>
-        <p:spPr>
-          <a:xfrm>
-            <a:off x="6532830" y="4707268"/>
-            <a:ext cx="1032165" cy="246221"/>
-          </a:xfrm>
-          <a:prstGeom prst="rect">
-            <a:avLst/>
-          </a:prstGeom>
-          <a:noFill/>
-          <a:ln>
-            <a:solidFill>
-              <a:schemeClr val="tx1"/>
-            </a:solidFill>
-          </a:ln>
-        </p:spPr>
-        <p:txBody>
-          <a:bodyPr wrap="square" rtlCol="0">
-            <a:spAutoFit/>
-          </a:bodyPr>
-          <a:lstStyle/>
-          <a:p>
-            <a:r>
-              <a:rPr lang="en-US" sz="1000" b="1" dirty="0">
-                <a:latin typeface="Tahoma" panose="020B0604030504040204" pitchFamily="34" charset="0"/>
-                <a:ea typeface="Tahoma" panose="020B0604030504040204" pitchFamily="34" charset="0"/>
-                <a:cs typeface="Tahoma" panose="020B0604030504040204" pitchFamily="34" charset="0"/>
-              </a:rPr>
-              <a:t>High</a:t>
-            </a:r>
-            <a:r>
-              <a:rPr lang="en-US" sz="1000" dirty="0">
-                <a:latin typeface="Tahoma" panose="020B0604030504040204" pitchFamily="34" charset="0"/>
-                <a:ea typeface="Tahoma" panose="020B0604030504040204" pitchFamily="34" charset="0"/>
-                <a:cs typeface="Tahoma" panose="020B0604030504040204" pitchFamily="34" charset="0"/>
-              </a:rPr>
-              <a:t> RI Value</a:t>
-            </a:r>
-            <a:endParaRPr lang="en-CA" sz="1000" dirty="0">
-              <a:latin typeface="Tahoma" panose="020B0604030504040204" pitchFamily="34" charset="0"/>
-              <a:ea typeface="Tahoma" panose="020B0604030504040204" pitchFamily="34" charset="0"/>
-              <a:cs typeface="Tahoma" panose="020B0604030504040204" pitchFamily="34" charset="0"/>
-            </a:endParaRPr>
-          </a:p>
-        </p:txBody>
-      </p:sp>
-      <p:sp>
-        <p:nvSpPr>
-          <p:cNvPr id="11" name="TextBox 10">
-            <a:extLst>
-              <a:ext uri="{FF2B5EF4-FFF2-40B4-BE49-F238E27FC236}">
-                <a16:creationId xmlns:a16="http://schemas.microsoft.com/office/drawing/2014/main" id="{84B47D9C-FE6A-4006-7116-FA3E65AA68CC}"/>
-              </a:ext>
-            </a:extLst>
-          </p:cNvPr>
-          <p:cNvSpPr txBox="1"/>
-          <p:nvPr/>
-        </p:nvSpPr>
-        <p:spPr>
-          <a:xfrm>
-            <a:off x="6795681" y="916015"/>
-            <a:ext cx="964003" cy="246221"/>
-          </a:xfrm>
-          <a:prstGeom prst="rect">
-            <a:avLst/>
-          </a:prstGeom>
-          <a:noFill/>
-          <a:ln>
-            <a:solidFill>
-              <a:schemeClr val="tx1"/>
-            </a:solidFill>
-          </a:ln>
-        </p:spPr>
-        <p:txBody>
-          <a:bodyPr wrap="square" rtlCol="0">
-            <a:spAutoFit/>
-          </a:bodyPr>
-          <a:lstStyle/>
-          <a:p>
-            <a:r>
-              <a:rPr lang="en-US" sz="1000" b="1" dirty="0">
-                <a:latin typeface="Tahoma" panose="020B0604030504040204" pitchFamily="34" charset="0"/>
-                <a:ea typeface="Tahoma" panose="020B0604030504040204" pitchFamily="34" charset="0"/>
-                <a:cs typeface="Tahoma" panose="020B0604030504040204" pitchFamily="34" charset="0"/>
-              </a:rPr>
-              <a:t>Low</a:t>
-            </a:r>
-            <a:r>
-              <a:rPr lang="en-US" sz="1000" dirty="0">
-                <a:latin typeface="Tahoma" panose="020B0604030504040204" pitchFamily="34" charset="0"/>
-                <a:ea typeface="Tahoma" panose="020B0604030504040204" pitchFamily="34" charset="0"/>
-                <a:cs typeface="Tahoma" panose="020B0604030504040204" pitchFamily="34" charset="0"/>
-              </a:rPr>
-              <a:t> RI Value</a:t>
-            </a:r>
-            <a:endParaRPr lang="en-CA" sz="1000" dirty="0">
-              <a:latin typeface="Tahoma" panose="020B0604030504040204" pitchFamily="34" charset="0"/>
-              <a:ea typeface="Tahoma" panose="020B0604030504040204" pitchFamily="34" charset="0"/>
-              <a:cs typeface="Tahoma" panose="020B0604030504040204" pitchFamily="34" charset="0"/>
-            </a:endParaRPr>
-          </a:p>
-        </p:txBody>
-      </p:sp>
-      <p:cxnSp>
-        <p:nvCxnSpPr>
-          <p:cNvPr id="13" name="Straight Arrow Connector 12">
-            <a:extLst>
-              <a:ext uri="{FF2B5EF4-FFF2-40B4-BE49-F238E27FC236}">
-                <a16:creationId xmlns:a16="http://schemas.microsoft.com/office/drawing/2014/main" id="{953B2240-44CC-384A-5E8B-0A7604709AF6}"/>
-              </a:ext>
-            </a:extLst>
-          </p:cNvPr>
-          <p:cNvCxnSpPr>
-            <a:cxnSpLocks/>
-          </p:cNvCxnSpPr>
-          <p:nvPr/>
-        </p:nvCxnSpPr>
-        <p:spPr>
-          <a:xfrm flipH="1" flipV="1">
-            <a:off x="6532830" y="4294909"/>
-            <a:ext cx="380588" cy="406697"/>
-          </a:xfrm>
-          <a:prstGeom prst="straightConnector1">
-            <a:avLst/>
-          </a:prstGeom>
-          <a:ln>
-            <a:tailEnd type="triangle"/>
-          </a:ln>
-        </p:spPr>
-        <p:style>
-          <a:lnRef idx="1">
-            <a:schemeClr val="dk1"/>
-          </a:lnRef>
-          <a:fillRef idx="0">
-            <a:schemeClr val="dk1"/>
-          </a:fillRef>
-          <a:effectRef idx="0">
-            <a:schemeClr val="dk1"/>
-          </a:effectRef>
-          <a:fontRef idx="minor">
-            <a:schemeClr val="tx1"/>
-          </a:fontRef>
-        </p:style>
-      </p:cxnSp>
-      <p:cxnSp>
-        <p:nvCxnSpPr>
-          <p:cNvPr id="18" name="Straight Arrow Connector 17">
-            <a:extLst>
-              <a:ext uri="{FF2B5EF4-FFF2-40B4-BE49-F238E27FC236}">
-                <a16:creationId xmlns:a16="http://schemas.microsoft.com/office/drawing/2014/main" id="{1BA1A699-EE5C-7772-4C2F-1C559F35DFC7}"/>
-              </a:ext>
-            </a:extLst>
-          </p:cNvPr>
-          <p:cNvCxnSpPr>
-            <a:cxnSpLocks/>
-          </p:cNvCxnSpPr>
-          <p:nvPr/>
-        </p:nvCxnSpPr>
-        <p:spPr>
-          <a:xfrm flipH="1">
-            <a:off x="6248400" y="1165716"/>
-            <a:ext cx="665018" cy="469077"/>
-          </a:xfrm>
-          <a:prstGeom prst="straightConnector1">
-            <a:avLst/>
-          </a:prstGeom>
-          <a:ln>
-            <a:tailEnd type="triangle"/>
-          </a:ln>
-        </p:spPr>
-        <p:style>
-          <a:lnRef idx="1">
-            <a:schemeClr val="dk1"/>
-          </a:lnRef>
-          <a:fillRef idx="0">
-            <a:schemeClr val="dk1"/>
-          </a:fillRef>
-          <a:effectRef idx="0">
-            <a:schemeClr val="dk1"/>
-          </a:effectRef>
-          <a:fontRef idx="minor">
-            <a:schemeClr val="tx1"/>
-          </a:fontRef>
-        </p:style>
-      </p:cxnSp>
-    </p:spTree>
-    <p:extLst>
-      <p:ext uri="{BB962C8B-B14F-4D97-AF65-F5344CB8AC3E}">
-        <p14:creationId xmlns:p14="http://schemas.microsoft.com/office/powerpoint/2010/main" val="484331973"/>
       </p:ext>
     </p:extLst>
   </p:cSld>
@@ -13472,6 +12326,11 @@
 
 <file path=customXml/item1.xml><?xml version="1.0" encoding="utf-8"?>
 <?mso-contentType ?>
+<SharedContentType xmlns="Microsoft.SharePoint.Taxonomy.ContentTypeSync" SourceId="3dae2bc9-964c-4bb7-94bc-c5dd0815213b" ContentTypeId="0x01010070FD3A26C879A74592BE4DD1CF6C17C51002" PreviousValue="false" LastSyncTimeStamp="2022-04-19T15:49:25.177Z"/>
+</file>
+
+<file path=customXml/item2.xml><?xml version="1.0" encoding="utf-8"?>
+<?mso-contentType ?>
 <spe:Receivers xmlns:spe="http://schemas.microsoft.com/sharepoint/events">
   <Receiver>
     <Name>Document ID Generator</Name>
@@ -13520,78 +12379,13 @@
 </spe:Receivers>
 </file>
 
-<file path=customXml/item2.xml><?xml version="1.0" encoding="utf-8"?>
+<file path=customXml/item3.xml><?xml version="1.0" encoding="utf-8"?>
 <?mso-contentType ?>
-<SharedContentType xmlns="Microsoft.SharePoint.Taxonomy.ContentTypeSync" SourceId="3dae2bc9-964c-4bb7-94bc-c5dd0815213b" ContentTypeId="0x01010070FD3A26C879A74592BE4DD1CF6C17C51002" PreviousValue="false" LastSyncTimeStamp="2022-04-19T15:49:25.177Z"/>
-</file>
-
-<file path=customXml/item3.xml><?xml version="1.0" encoding="utf-8"?>
-<p:properties xmlns:p="http://schemas.microsoft.com/office/2006/metadata/properties" xmlns:xsi="http://www.w3.org/2001/XMLSchema-instance" xmlns:pc="http://schemas.microsoft.com/office/infopath/2007/PartnerControls">
-  <documentManagement>
-    <TaxCatchAll xmlns="b73fb41d-4db5-49df-b889-ce373c40e3ec">
-      <Value>2</Value>
-      <Value>224</Value>
-      <Value>1585</Value>
-      <Value>3</Value>
-      <Value>1022</Value>
-      <Value>1598</Value>
-    </TaxCatchAll>
-    <Year xmlns="b73fb41d-4db5-49df-b889-ce373c40e3ec">2021</Year>
-    <TaxKeywordTaxHTField xmlns="b73fb41d-4db5-49df-b889-ce373c40e3ec">
-      <Terms xmlns="http://schemas.microsoft.com/office/infopath/2007/PartnerControls">
-        <TermInfo xmlns="http://schemas.microsoft.com/office/infopath/2007/PartnerControls">
-          <TermName xmlns="http://schemas.microsoft.com/office/infopath/2007/PartnerControls">16:9</TermName>
-          <TermId xmlns="http://schemas.microsoft.com/office/infopath/2007/PartnerControls">df0a0d5b-ae80-4841-b2fe-8ddcb8e3222c</TermId>
-        </TermInfo>
-        <TermInfo xmlns="http://schemas.microsoft.com/office/infopath/2007/PartnerControls">
-          <TermName xmlns="http://schemas.microsoft.com/office/infopath/2007/PartnerControls">Presentation</TermName>
-          <TermId xmlns="http://schemas.microsoft.com/office/infopath/2007/PartnerControls">59fc26f9-1c9d-40bc-8a58-d66d91dcc0d5</TermId>
-        </TermInfo>
-      </Terms>
-    </TaxKeywordTaxHTField>
-    <_dlc_DocId xmlns="9daf4fce-efdb-4f08-985f-94c0458ac4da">COLL-1941601530-77</_dlc_DocId>
-    <_dlc_DocIdUrl xmlns="9daf4fce-efdb-4f08-985f-94c0458ac4da">
-      <Url>https://itncc.sharepoint.com/sites/MarketingCollaboration/_layouts/DocIdRedir.aspx?ID=COLL-1941601530-77</Url>
-      <Description>COLL-1941601530-77</Description>
-    </_dlc_DocIdUrl>
-    <hf62e2b7c9654133b3ca7da47c388bce xmlns="b73fb41d-4db5-49df-b889-ce373c40e3ec">
-      <Terms xmlns="http://schemas.microsoft.com/office/infopath/2007/PartnerControls">
-        <TermInfo xmlns="http://schemas.microsoft.com/office/infopath/2007/PartnerControls">
-          <TermName xmlns="http://schemas.microsoft.com/office/infopath/2007/PartnerControls">Marketing and Development</TermName>
-          <TermId xmlns="http://schemas.microsoft.com/office/infopath/2007/PartnerControls">cb043f34-81be-43cd-aebf-735cc7c51d79</TermId>
-        </TermInfo>
-      </Terms>
-    </hf62e2b7c9654133b3ca7da47c388bce>
-    <e5445ced404845ff8a2b3be9c8f7c65c xmlns="b73fb41d-4db5-49df-b889-ce373c40e3ec">
-      <Terms xmlns="http://schemas.microsoft.com/office/infopath/2007/PartnerControls">
-        <TermInfo xmlns="http://schemas.microsoft.com/office/infopath/2007/PartnerControls">
-          <TermName xmlns="http://schemas.microsoft.com/office/infopath/2007/PartnerControls">National</TermName>
-          <TermId xmlns="http://schemas.microsoft.com/office/infopath/2007/PartnerControls">60e160cc-5b62-440e-88bf-c8c5292327f4</TermId>
-        </TermInfo>
-      </Terms>
-    </e5445ced404845ff8a2b3be9c8f7c65c>
-    <Topic xmlns="b73fb41d-4db5-49df-b889-ce373c40e3ec">Presentation</Topic>
-    <j851f0c75970476ca044f56c831142c9 xmlns="b73fb41d-4db5-49df-b889-ce373c40e3ec">
-      <Terms xmlns="http://schemas.microsoft.com/office/infopath/2007/PartnerControls">
-        <TermInfo xmlns="http://schemas.microsoft.com/office/infopath/2007/PartnerControls">
-          <TermName xmlns="http://schemas.microsoft.com/office/infopath/2007/PartnerControls">Editable Creative</TermName>
-          <TermId xmlns="http://schemas.microsoft.com/office/infopath/2007/PartnerControls">29fc3b9e-2d01-4eeb-9c55-b9ac82cf2c15</TermId>
-        </TermInfo>
-      </Terms>
-    </j851f0c75970476ca044f56c831142c9>
-    <h5d00e838cac4a36b66416c1ac0f08f4 xmlns="b73fb41d-4db5-49df-b889-ce373c40e3ec">
-      <Terms xmlns="http://schemas.microsoft.com/office/infopath/2007/PartnerControls"/>
-    </h5d00e838cac4a36b66416c1ac0f08f4>
-    <pde0b5a6bb7242599ac30d59622b742d xmlns="b73fb41d-4db5-49df-b889-ce373c40e3ec">
-      <Terms xmlns="http://schemas.microsoft.com/office/infopath/2007/PartnerControls">
-        <TermInfo xmlns="http://schemas.microsoft.com/office/infopath/2007/PartnerControls">
-          <TermName xmlns="http://schemas.microsoft.com/office/infopath/2007/PartnerControls">Administration</TermName>
-          <TermId xmlns="http://schemas.microsoft.com/office/infopath/2007/PartnerControls">15579f7e-1289-4124-875f-fbfdd1ce1e19</TermId>
-        </TermInfo>
-      </Terms>
-    </pde0b5a6bb7242599ac30d59622b742d>
-  </documentManagement>
-</p:properties>
+<FormTemplates xmlns="http://schemas.microsoft.com/sharepoint/v3/contenttype/forms">
+  <Display>DocumentLibraryForm</Display>
+  <Edit>DocumentLibraryForm</Edit>
+  <New>DocumentLibraryForm</New>
+</FormTemplates>
 </file>
 
 <file path=customXml/item4.xml><?xml version="1.0" encoding="utf-8"?>
@@ -13856,15 +12650,83 @@
 </file>
 
 <file path=customXml/item5.xml><?xml version="1.0" encoding="utf-8"?>
-<?mso-contentType ?>
-<FormTemplates xmlns="http://schemas.microsoft.com/sharepoint/v3/contenttype/forms">
-  <Display>DocumentLibraryForm</Display>
-  <Edit>DocumentLibraryForm</Edit>
-  <New>DocumentLibraryForm</New>
-</FormTemplates>
+<p:properties xmlns:p="http://schemas.microsoft.com/office/2006/metadata/properties" xmlns:xsi="http://www.w3.org/2001/XMLSchema-instance" xmlns:pc="http://schemas.microsoft.com/office/infopath/2007/PartnerControls">
+  <documentManagement>
+    <TaxCatchAll xmlns="b73fb41d-4db5-49df-b889-ce373c40e3ec">
+      <Value>2</Value>
+      <Value>224</Value>
+      <Value>1585</Value>
+      <Value>3</Value>
+      <Value>1022</Value>
+      <Value>1598</Value>
+    </TaxCatchAll>
+    <Year xmlns="b73fb41d-4db5-49df-b889-ce373c40e3ec">2021</Year>
+    <TaxKeywordTaxHTField xmlns="b73fb41d-4db5-49df-b889-ce373c40e3ec">
+      <Terms xmlns="http://schemas.microsoft.com/office/infopath/2007/PartnerControls">
+        <TermInfo xmlns="http://schemas.microsoft.com/office/infopath/2007/PartnerControls">
+          <TermName xmlns="http://schemas.microsoft.com/office/infopath/2007/PartnerControls">16:9</TermName>
+          <TermId xmlns="http://schemas.microsoft.com/office/infopath/2007/PartnerControls">df0a0d5b-ae80-4841-b2fe-8ddcb8e3222c</TermId>
+        </TermInfo>
+        <TermInfo xmlns="http://schemas.microsoft.com/office/infopath/2007/PartnerControls">
+          <TermName xmlns="http://schemas.microsoft.com/office/infopath/2007/PartnerControls">Presentation</TermName>
+          <TermId xmlns="http://schemas.microsoft.com/office/infopath/2007/PartnerControls">59fc26f9-1c9d-40bc-8a58-d66d91dcc0d5</TermId>
+        </TermInfo>
+      </Terms>
+    </TaxKeywordTaxHTField>
+    <_dlc_DocId xmlns="9daf4fce-efdb-4f08-985f-94c0458ac4da">COLL-1941601530-77</_dlc_DocId>
+    <_dlc_DocIdUrl xmlns="9daf4fce-efdb-4f08-985f-94c0458ac4da">
+      <Url>https://itncc.sharepoint.com/sites/MarketingCollaboration/_layouts/DocIdRedir.aspx?ID=COLL-1941601530-77</Url>
+      <Description>COLL-1941601530-77</Description>
+    </_dlc_DocIdUrl>
+    <hf62e2b7c9654133b3ca7da47c388bce xmlns="b73fb41d-4db5-49df-b889-ce373c40e3ec">
+      <Terms xmlns="http://schemas.microsoft.com/office/infopath/2007/PartnerControls">
+        <TermInfo xmlns="http://schemas.microsoft.com/office/infopath/2007/PartnerControls">
+          <TermName xmlns="http://schemas.microsoft.com/office/infopath/2007/PartnerControls">Marketing and Development</TermName>
+          <TermId xmlns="http://schemas.microsoft.com/office/infopath/2007/PartnerControls">cb043f34-81be-43cd-aebf-735cc7c51d79</TermId>
+        </TermInfo>
+      </Terms>
+    </hf62e2b7c9654133b3ca7da47c388bce>
+    <e5445ced404845ff8a2b3be9c8f7c65c xmlns="b73fb41d-4db5-49df-b889-ce373c40e3ec">
+      <Terms xmlns="http://schemas.microsoft.com/office/infopath/2007/PartnerControls">
+        <TermInfo xmlns="http://schemas.microsoft.com/office/infopath/2007/PartnerControls">
+          <TermName xmlns="http://schemas.microsoft.com/office/infopath/2007/PartnerControls">National</TermName>
+          <TermId xmlns="http://schemas.microsoft.com/office/infopath/2007/PartnerControls">60e160cc-5b62-440e-88bf-c8c5292327f4</TermId>
+        </TermInfo>
+      </Terms>
+    </e5445ced404845ff8a2b3be9c8f7c65c>
+    <Topic xmlns="b73fb41d-4db5-49df-b889-ce373c40e3ec">Presentation</Topic>
+    <j851f0c75970476ca044f56c831142c9 xmlns="b73fb41d-4db5-49df-b889-ce373c40e3ec">
+      <Terms xmlns="http://schemas.microsoft.com/office/infopath/2007/PartnerControls">
+        <TermInfo xmlns="http://schemas.microsoft.com/office/infopath/2007/PartnerControls">
+          <TermName xmlns="http://schemas.microsoft.com/office/infopath/2007/PartnerControls">Editable Creative</TermName>
+          <TermId xmlns="http://schemas.microsoft.com/office/infopath/2007/PartnerControls">29fc3b9e-2d01-4eeb-9c55-b9ac82cf2c15</TermId>
+        </TermInfo>
+      </Terms>
+    </j851f0c75970476ca044f56c831142c9>
+    <h5d00e838cac4a36b66416c1ac0f08f4 xmlns="b73fb41d-4db5-49df-b889-ce373c40e3ec">
+      <Terms xmlns="http://schemas.microsoft.com/office/infopath/2007/PartnerControls"/>
+    </h5d00e838cac4a36b66416c1ac0f08f4>
+    <pde0b5a6bb7242599ac30d59622b742d xmlns="b73fb41d-4db5-49df-b889-ce373c40e3ec">
+      <Terms xmlns="http://schemas.microsoft.com/office/infopath/2007/PartnerControls">
+        <TermInfo xmlns="http://schemas.microsoft.com/office/infopath/2007/PartnerControls">
+          <TermName xmlns="http://schemas.microsoft.com/office/infopath/2007/PartnerControls">Administration</TermName>
+          <TermId xmlns="http://schemas.microsoft.com/office/infopath/2007/PartnerControls">15579f7e-1289-4124-875f-fbfdd1ce1e19</TermId>
+        </TermInfo>
+      </Terms>
+    </pde0b5a6bb7242599ac30d59622b742d>
+  </documentManagement>
+</p:properties>
 </file>
 
 <file path=customXml/itemProps1.xml><?xml version="1.0" encoding="utf-8"?>
+<ds:datastoreItem xmlns:ds="http://schemas.openxmlformats.org/officeDocument/2006/customXml" ds:itemID="{C04A9EA0-F30C-4FDA-9437-BDAB378662C2}">
+  <ds:schemaRefs>
+    <ds:schemaRef ds:uri="Microsoft.SharePoint.Taxonomy.ContentTypeSync"/>
+  </ds:schemaRefs>
+</ds:datastoreItem>
+</file>
+
+<file path=customXml/itemProps2.xml><?xml version="1.0" encoding="utf-8"?>
 <ds:datastoreItem xmlns:ds="http://schemas.openxmlformats.org/officeDocument/2006/customXml" ds:itemID="{75F25848-81A4-4056-9048-FD884C8DD719}">
   <ds:schemaRefs>
     <ds:schemaRef ds:uri="http://schemas.microsoft.com/sharepoint/events"/>
@@ -13872,27 +12734,10 @@
 </ds:datastoreItem>
 </file>
 
-<file path=customXml/itemProps2.xml><?xml version="1.0" encoding="utf-8"?>
-<ds:datastoreItem xmlns:ds="http://schemas.openxmlformats.org/officeDocument/2006/customXml" ds:itemID="{C04A9EA0-F30C-4FDA-9437-BDAB378662C2}">
+<file path=customXml/itemProps3.xml><?xml version="1.0" encoding="utf-8"?>
+<ds:datastoreItem xmlns:ds="http://schemas.openxmlformats.org/officeDocument/2006/customXml" ds:itemID="{E3070A85-BE5F-4ECE-B1F6-8D04067ED971}">
   <ds:schemaRefs>
-    <ds:schemaRef ds:uri="Microsoft.SharePoint.Taxonomy.ContentTypeSync"/>
-  </ds:schemaRefs>
-</ds:datastoreItem>
-</file>
-
-<file path=customXml/itemProps3.xml><?xml version="1.0" encoding="utf-8"?>
-<ds:datastoreItem xmlns:ds="http://schemas.openxmlformats.org/officeDocument/2006/customXml" ds:itemID="{9C876B4E-9239-4840-BF5E-B55D728E076B}">
-  <ds:schemaRefs>
-    <ds:schemaRef ds:uri="http://purl.org/dc/dcmitype/"/>
-    <ds:schemaRef ds:uri="http://purl.org/dc/terms/"/>
-    <ds:schemaRef ds:uri="9daf4fce-efdb-4f08-985f-94c0458ac4da"/>
-    <ds:schemaRef ds:uri="http://www.w3.org/XML/1998/namespace"/>
-    <ds:schemaRef ds:uri="http://schemas.microsoft.com/office/2006/documentManagement/types"/>
-    <ds:schemaRef ds:uri="http://purl.org/dc/elements/1.1/"/>
-    <ds:schemaRef ds:uri="http://schemas.microsoft.com/office/2006/metadata/properties"/>
-    <ds:schemaRef ds:uri="http://schemas.openxmlformats.org/package/2006/metadata/core-properties"/>
-    <ds:schemaRef ds:uri="http://schemas.microsoft.com/office/infopath/2007/PartnerControls"/>
-    <ds:schemaRef ds:uri="b73fb41d-4db5-49df-b889-ce373c40e3ec"/>
+    <ds:schemaRef ds:uri="http://schemas.microsoft.com/sharepoint/v3/contenttype/forms"/>
   </ds:schemaRefs>
 </ds:datastoreItem>
 </file>
@@ -13917,9 +12762,18 @@
 </file>
 
 <file path=customXml/itemProps5.xml><?xml version="1.0" encoding="utf-8"?>
-<ds:datastoreItem xmlns:ds="http://schemas.openxmlformats.org/officeDocument/2006/customXml" ds:itemID="{E3070A85-BE5F-4ECE-B1F6-8D04067ED971}">
+<ds:datastoreItem xmlns:ds="http://schemas.openxmlformats.org/officeDocument/2006/customXml" ds:itemID="{9C876B4E-9239-4840-BF5E-B55D728E076B}">
   <ds:schemaRefs>
-    <ds:schemaRef ds:uri="http://schemas.microsoft.com/sharepoint/v3/contenttype/forms"/>
+    <ds:schemaRef ds:uri="http://purl.org/dc/elements/1.1/"/>
+    <ds:schemaRef ds:uri="http://schemas.openxmlformats.org/package/2006/metadata/core-properties"/>
+    <ds:schemaRef ds:uri="http://www.w3.org/XML/1998/namespace"/>
+    <ds:schemaRef ds:uri="http://schemas.microsoft.com/office/2006/documentManagement/types"/>
+    <ds:schemaRef ds:uri="http://purl.org/dc/dcmitype/"/>
+    <ds:schemaRef ds:uri="http://schemas.microsoft.com/office/infopath/2007/PartnerControls"/>
+    <ds:schemaRef ds:uri="b73fb41d-4db5-49df-b889-ce373c40e3ec"/>
+    <ds:schemaRef ds:uri="9daf4fce-efdb-4f08-985f-94c0458ac4da"/>
+    <ds:schemaRef ds:uri="http://schemas.microsoft.com/office/2006/metadata/properties"/>
+    <ds:schemaRef ds:uri="http://purl.org/dc/terms/"/>
   </ds:schemaRefs>
 </ds:datastoreItem>
 </file>
</xml_diff>